<commit_message>
Update Solar Technovation Workflow.pptx
</commit_message>
<xml_diff>
--- a/Workflow/Solar Technovation Workflow.pptx
+++ b/Workflow/Solar Technovation Workflow.pptx
@@ -11,30 +11,32 @@
     <p:sldId id="256" r:id="rId6"/>
     <p:sldId id="257" r:id="rId7"/>
     <p:sldId id="258" r:id="rId8"/>
+    <p:sldId id="259" r:id="rId9"/>
+    <p:sldId id="260" r:id="rId10"/>
   </p:sldIdLst>
   <p:sldSz cy="5143500" cx="9144000"/>
   <p:notesSz cx="6858000" cy="9144000"/>
   <p:embeddedFontLst>
     <p:embeddedFont>
       <p:font typeface="Roboto"/>
-      <p:regular r:id="rId9"/>
-      <p:bold r:id="rId10"/>
-      <p:italic r:id="rId11"/>
-      <p:boldItalic r:id="rId12"/>
+      <p:regular r:id="rId11"/>
+      <p:bold r:id="rId12"/>
+      <p:italic r:id="rId13"/>
+      <p:boldItalic r:id="rId14"/>
     </p:embeddedFont>
     <p:embeddedFont>
       <p:font typeface="Montserrat"/>
-      <p:regular r:id="rId13"/>
-      <p:bold r:id="rId14"/>
-      <p:italic r:id="rId15"/>
-      <p:boldItalic r:id="rId16"/>
+      <p:regular r:id="rId15"/>
+      <p:bold r:id="rId16"/>
+      <p:italic r:id="rId17"/>
+      <p:boldItalic r:id="rId18"/>
     </p:embeddedFont>
     <p:embeddedFont>
       <p:font typeface="Lato"/>
-      <p:regular r:id="rId17"/>
-      <p:bold r:id="rId18"/>
-      <p:italic r:id="rId19"/>
-      <p:boldItalic r:id="rId20"/>
+      <p:regular r:id="rId19"/>
+      <p:bold r:id="rId20"/>
+      <p:italic r:id="rId21"/>
+      <p:boldItalic r:id="rId22"/>
     </p:embeddedFont>
   </p:embeddedFontLst>
   <p:defaultTextStyle>
@@ -829,7 +831,7 @@
       </p:grpSpPr>
       <p:sp>
         <p:nvSpPr>
-          <p:cNvPr id="137" name="Google Shape;137;g103257bacdf_0_224:notes"/>
+          <p:cNvPr id="137" name="Google Shape;137;g103257bacdf_0_911:notes"/>
           <p:cNvSpPr/>
           <p:nvPr>
             <p:ph idx="2" type="sldImg"/>
@@ -864,7 +866,7 @@
       </p:sp>
       <p:sp>
         <p:nvSpPr>
-          <p:cNvPr id="138" name="Google Shape;138;g103257bacdf_0_224:notes"/>
+          <p:cNvPr id="138" name="Google Shape;138;g103257bacdf_0_911:notes"/>
           <p:cNvSpPr txBox="1"/>
           <p:nvPr>
             <p:ph idx="1" type="body"/>
@@ -914,7 +916,7 @@
   <p:cSld>
     <p:spTree>
       <p:nvGrpSpPr>
-        <p:cNvPr id="142" name="Shape 142"/>
+        <p:cNvPr id="186" name="Shape 186"/>
         <p:cNvGrpSpPr/>
         <p:nvPr/>
       </p:nvGrpSpPr>
@@ -928,7 +930,7 @@
       </p:grpSpPr>
       <p:sp>
         <p:nvSpPr>
-          <p:cNvPr id="143" name="Google Shape;143;g103257bacdf_0_911:notes"/>
+          <p:cNvPr id="187" name="Google Shape;187;g103257bacdf_0_224:notes"/>
           <p:cNvSpPr/>
           <p:nvPr>
             <p:ph idx="2" type="sldImg"/>
@@ -963,7 +965,205 @@
       </p:sp>
       <p:sp>
         <p:nvSpPr>
-          <p:cNvPr id="144" name="Google Shape;144;g103257bacdf_0_911:notes"/>
+          <p:cNvPr id="188" name="Google Shape;188;g103257bacdf_0_224:notes"/>
+          <p:cNvSpPr txBox="1"/>
+          <p:nvPr>
+            <p:ph idx="1" type="body"/>
+          </p:nvPr>
+        </p:nvSpPr>
+        <p:spPr>
+          <a:xfrm>
+            <a:off x="685800" y="4343400"/>
+            <a:ext cx="5486400" cy="4114800"/>
+          </a:xfrm>
+          <a:prstGeom prst="rect">
+            <a:avLst/>
+          </a:prstGeom>
+        </p:spPr>
+        <p:txBody>
+          <a:bodyPr anchorCtr="0" anchor="t" bIns="91425" lIns="91425" spcFirstLastPara="1" rIns="91425" wrap="square" tIns="91425">
+            <a:noAutofit/>
+          </a:bodyPr>
+          <a:lstStyle/>
+          <a:p>
+            <a:pPr indent="0" lvl="0" marL="0" rtl="0" algn="l">
+              <a:spcBef>
+                <a:spcPts val="0"/>
+              </a:spcBef>
+              <a:spcAft>
+                <a:spcPts val="0"/>
+              </a:spcAft>
+              <a:buNone/>
+            </a:pPr>
+            <a:r>
+              <a:t/>
+            </a:r>
+            <a:endParaRPr/>
+          </a:p>
+        </p:txBody>
+      </p:sp>
+    </p:spTree>
+  </p:cSld>
+  <p:clrMapOvr>
+    <a:masterClrMapping/>
+  </p:clrMapOvr>
+</p:notes>
+</file>
+
+<file path=ppt/notesSlides/notesSlide4.xml><?xml version="1.0" encoding="utf-8"?>
+<p:notes xmlns:a="http://schemas.openxmlformats.org/drawingml/2006/main" xmlns:r="http://schemas.openxmlformats.org/officeDocument/2006/relationships" xmlns:mc="http://schemas.openxmlformats.org/markup-compatibility/2006" xmlns:mv="urn:schemas-microsoft-com:mac:vml" xmlns:p="http://schemas.openxmlformats.org/presentationml/2006/main" xmlns:c="http://schemas.openxmlformats.org/drawingml/2006/chart" xmlns:dgm="http://schemas.openxmlformats.org/drawingml/2006/diagram" xmlns:o="urn:schemas-microsoft-com:office:office" xmlns:v="urn:schemas-microsoft-com:vml" xmlns:pvml="urn:schemas-microsoft-com:office:powerpoint" xmlns:com="http://schemas.openxmlformats.org/drawingml/2006/compatibility" xmlns:p14="http://schemas.microsoft.com/office/powerpoint/2010/main" xmlns:p15="http://schemas.microsoft.com/office/powerpoint/2012/main" xmlns:ahyp="http://schemas.microsoft.com/office/drawing/2018/hyperlinkcolor" showMasterPhAnim="0" showMasterSp="0">
+  <p:cSld>
+    <p:spTree>
+      <p:nvGrpSpPr>
+        <p:cNvPr id="192" name="Shape 192"/>
+        <p:cNvGrpSpPr/>
+        <p:nvPr/>
+      </p:nvGrpSpPr>
+      <p:grpSpPr>
+        <a:xfrm>
+          <a:off x="0" y="0"/>
+          <a:ext cx="0" cy="0"/>
+          <a:chOff x="0" y="0"/>
+          <a:chExt cx="0" cy="0"/>
+        </a:xfrm>
+      </p:grpSpPr>
+      <p:sp>
+        <p:nvSpPr>
+          <p:cNvPr id="193" name="Google Shape;193;g103257bacdf_0_2464:notes"/>
+          <p:cNvSpPr/>
+          <p:nvPr>
+            <p:ph idx="2" type="sldImg"/>
+          </p:nvPr>
+        </p:nvSpPr>
+        <p:spPr>
+          <a:xfrm>
+            <a:off x="381300" y="685800"/>
+            <a:ext cx="6096000" cy="3429000"/>
+          </a:xfrm>
+          <a:custGeom>
+            <a:rect b="b" l="l" r="r" t="t"/>
+            <a:pathLst>
+              <a:path extrusionOk="0" h="120000" w="120000">
+                <a:moveTo>
+                  <a:pt x="0" y="0"/>
+                </a:moveTo>
+                <a:lnTo>
+                  <a:pt x="120000" y="0"/>
+                </a:lnTo>
+                <a:lnTo>
+                  <a:pt x="120000" y="120000"/>
+                </a:lnTo>
+                <a:lnTo>
+                  <a:pt x="0" y="120000"/>
+                </a:lnTo>
+                <a:close/>
+              </a:path>
+            </a:pathLst>
+          </a:custGeom>
+        </p:spPr>
+      </p:sp>
+      <p:sp>
+        <p:nvSpPr>
+          <p:cNvPr id="194" name="Google Shape;194;g103257bacdf_0_2464:notes"/>
+          <p:cNvSpPr txBox="1"/>
+          <p:nvPr>
+            <p:ph idx="1" type="body"/>
+          </p:nvPr>
+        </p:nvSpPr>
+        <p:spPr>
+          <a:xfrm>
+            <a:off x="685800" y="4343400"/>
+            <a:ext cx="5486400" cy="4114800"/>
+          </a:xfrm>
+          <a:prstGeom prst="rect">
+            <a:avLst/>
+          </a:prstGeom>
+        </p:spPr>
+        <p:txBody>
+          <a:bodyPr anchorCtr="0" anchor="t" bIns="91425" lIns="91425" spcFirstLastPara="1" rIns="91425" wrap="square" tIns="91425">
+            <a:noAutofit/>
+          </a:bodyPr>
+          <a:lstStyle/>
+          <a:p>
+            <a:pPr indent="0" lvl="0" marL="0" rtl="0" algn="l">
+              <a:spcBef>
+                <a:spcPts val="0"/>
+              </a:spcBef>
+              <a:spcAft>
+                <a:spcPts val="0"/>
+              </a:spcAft>
+              <a:buNone/>
+            </a:pPr>
+            <a:r>
+              <a:t/>
+            </a:r>
+            <a:endParaRPr/>
+          </a:p>
+        </p:txBody>
+      </p:sp>
+    </p:spTree>
+  </p:cSld>
+  <p:clrMapOvr>
+    <a:masterClrMapping/>
+  </p:clrMapOvr>
+</p:notes>
+</file>
+
+<file path=ppt/notesSlides/notesSlide5.xml><?xml version="1.0" encoding="utf-8"?>
+<p:notes xmlns:a="http://schemas.openxmlformats.org/drawingml/2006/main" xmlns:r="http://schemas.openxmlformats.org/officeDocument/2006/relationships" xmlns:mc="http://schemas.openxmlformats.org/markup-compatibility/2006" xmlns:mv="urn:schemas-microsoft-com:mac:vml" xmlns:p="http://schemas.openxmlformats.org/presentationml/2006/main" xmlns:c="http://schemas.openxmlformats.org/drawingml/2006/chart" xmlns:dgm="http://schemas.openxmlformats.org/drawingml/2006/diagram" xmlns:o="urn:schemas-microsoft-com:office:office" xmlns:v="urn:schemas-microsoft-com:vml" xmlns:pvml="urn:schemas-microsoft-com:office:powerpoint" xmlns:com="http://schemas.openxmlformats.org/drawingml/2006/compatibility" xmlns:p14="http://schemas.microsoft.com/office/powerpoint/2010/main" xmlns:p15="http://schemas.microsoft.com/office/powerpoint/2012/main" xmlns:ahyp="http://schemas.microsoft.com/office/drawing/2018/hyperlinkcolor" showMasterPhAnim="0" showMasterSp="0">
+  <p:cSld>
+    <p:spTree>
+      <p:nvGrpSpPr>
+        <p:cNvPr id="198" name="Shape 198"/>
+        <p:cNvGrpSpPr/>
+        <p:nvPr/>
+      </p:nvGrpSpPr>
+      <p:grpSpPr>
+        <a:xfrm>
+          <a:off x="0" y="0"/>
+          <a:ext cx="0" cy="0"/>
+          <a:chOff x="0" y="0"/>
+          <a:chExt cx="0" cy="0"/>
+        </a:xfrm>
+      </p:grpSpPr>
+      <p:sp>
+        <p:nvSpPr>
+          <p:cNvPr id="199" name="Google Shape;199;g103257bacdf_0_2469:notes"/>
+          <p:cNvSpPr/>
+          <p:nvPr>
+            <p:ph idx="2" type="sldImg"/>
+          </p:nvPr>
+        </p:nvSpPr>
+        <p:spPr>
+          <a:xfrm>
+            <a:off x="381300" y="685800"/>
+            <a:ext cx="6096000" cy="3429000"/>
+          </a:xfrm>
+          <a:custGeom>
+            <a:rect b="b" l="l" r="r" t="t"/>
+            <a:pathLst>
+              <a:path extrusionOk="0" h="120000" w="120000">
+                <a:moveTo>
+                  <a:pt x="0" y="0"/>
+                </a:moveTo>
+                <a:lnTo>
+                  <a:pt x="120000" y="0"/>
+                </a:lnTo>
+                <a:lnTo>
+                  <a:pt x="120000" y="120000"/>
+                </a:lnTo>
+                <a:lnTo>
+                  <a:pt x="0" y="120000"/>
+                </a:lnTo>
+                <a:close/>
+              </a:path>
+            </a:pathLst>
+          </a:custGeom>
+        </p:spPr>
+      </p:sp>
+      <p:sp>
+        <p:nvSpPr>
+          <p:cNvPr id="200" name="Google Shape;200;g103257bacdf_0_2469:notes"/>
           <p:cNvSpPr txBox="1"/>
           <p:nvPr>
             <p:ph idx="1" type="body"/>
@@ -9258,8 +9458,8 @@
         </p:nvSpPr>
         <p:spPr>
           <a:xfrm>
-            <a:off x="5083950" y="3157300"/>
-            <a:ext cx="3470700" cy="506100"/>
+            <a:off x="5097600" y="2713375"/>
+            <a:ext cx="1896600" cy="506100"/>
           </a:xfrm>
           <a:prstGeom prst="rect">
             <a:avLst/>
@@ -9311,6 +9511,13 @@
 <file path=ppt/slides/slide2.xml><?xml version="1.0" encoding="utf-8"?>
 <p:sld xmlns:a="http://schemas.openxmlformats.org/drawingml/2006/main" xmlns:r="http://schemas.openxmlformats.org/officeDocument/2006/relationships" xmlns:mc="http://schemas.openxmlformats.org/markup-compatibility/2006" xmlns:mv="urn:schemas-microsoft-com:mac:vml" xmlns:p="http://schemas.openxmlformats.org/presentationml/2006/main" xmlns:c="http://schemas.openxmlformats.org/drawingml/2006/chart" xmlns:dgm="http://schemas.openxmlformats.org/drawingml/2006/diagram" xmlns:o="urn:schemas-microsoft-com:office:office" xmlns:v="urn:schemas-microsoft-com:vml" xmlns:pvml="urn:schemas-microsoft-com:office:powerpoint" xmlns:com="http://schemas.openxmlformats.org/drawingml/2006/compatibility" xmlns:p14="http://schemas.microsoft.com/office/powerpoint/2010/main" xmlns:p15="http://schemas.microsoft.com/office/powerpoint/2012/main" xmlns:ahyp="http://schemas.microsoft.com/office/drawing/2018/hyperlinkcolor">
   <p:cSld>
+    <p:bg>
+      <p:bgPr>
+        <a:solidFill>
+          <a:schemeClr val="lt1"/>
+        </a:solidFill>
+      </p:bgPr>
+    </p:bg>
     <p:spTree>
       <p:nvGrpSpPr>
         <p:cNvPr id="139" name="Shape 139"/>
@@ -9328,190 +9535,6 @@
       <p:sp>
         <p:nvSpPr>
           <p:cNvPr id="140" name="Google Shape;140;p14"/>
-          <p:cNvSpPr txBox="1"/>
-          <p:nvPr>
-            <p:ph type="title"/>
-          </p:nvPr>
-        </p:nvSpPr>
-        <p:spPr>
-          <a:xfrm>
-            <a:off x="1297500" y="393750"/>
-            <a:ext cx="7038900" cy="914100"/>
-          </a:xfrm>
-          <a:prstGeom prst="rect">
-            <a:avLst/>
-          </a:prstGeom>
-        </p:spPr>
-        <p:txBody>
-          <a:bodyPr anchorCtr="0" anchor="t" bIns="91425" lIns="91425" spcFirstLastPara="1" rIns="91425" wrap="square" tIns="91425">
-            <a:normAutofit/>
-          </a:bodyPr>
-          <a:lstStyle/>
-          <a:p>
-            <a:pPr indent="0" lvl="0" marL="0" rtl="0" algn="l">
-              <a:spcBef>
-                <a:spcPts val="0"/>
-              </a:spcBef>
-              <a:spcAft>
-                <a:spcPts val="0"/>
-              </a:spcAft>
-              <a:buNone/>
-            </a:pPr>
-            <a:r>
-              <a:rPr lang="en" sz="3000"/>
-              <a:t>Targets to accomplish</a:t>
-            </a:r>
-            <a:endParaRPr sz="3000"/>
-          </a:p>
-        </p:txBody>
-      </p:sp>
-      <p:sp>
-        <p:nvSpPr>
-          <p:cNvPr id="141" name="Google Shape;141;p14"/>
-          <p:cNvSpPr txBox="1"/>
-          <p:nvPr>
-            <p:ph idx="1" type="body"/>
-          </p:nvPr>
-        </p:nvSpPr>
-        <p:spPr>
-          <a:xfrm>
-            <a:off x="1297500" y="1567550"/>
-            <a:ext cx="7038900" cy="2911200"/>
-          </a:xfrm>
-          <a:prstGeom prst="rect">
-            <a:avLst/>
-          </a:prstGeom>
-        </p:spPr>
-        <p:txBody>
-          <a:bodyPr anchorCtr="0" anchor="t" bIns="91425" lIns="91425" spcFirstLastPara="1" rIns="91425" wrap="square" tIns="91425">
-            <a:normAutofit/>
-          </a:bodyPr>
-          <a:lstStyle/>
-          <a:p>
-            <a:pPr indent="-355600" lvl="0" marL="457200" rtl="0" algn="l">
-              <a:spcBef>
-                <a:spcPts val="0"/>
-              </a:spcBef>
-              <a:spcAft>
-                <a:spcPts val="0"/>
-              </a:spcAft>
-              <a:buSzPts val="2000"/>
-              <a:buChar char="●"/>
-            </a:pPr>
-            <a:r>
-              <a:rPr lang="en" sz="2000"/>
-              <a:t>Using </a:t>
-            </a:r>
-            <a:r>
-              <a:rPr i="1" lang="en" sz="2000"/>
-              <a:t>do_mpc</a:t>
-            </a:r>
-            <a:r>
-              <a:rPr lang="en" sz="2000"/>
-              <a:t> python library for optimization</a:t>
-            </a:r>
-            <a:endParaRPr sz="2000"/>
-          </a:p>
-          <a:p>
-            <a:pPr indent="-355600" lvl="0" marL="457200" rtl="0" algn="l">
-              <a:spcBef>
-                <a:spcPts val="0"/>
-              </a:spcBef>
-              <a:spcAft>
-                <a:spcPts val="0"/>
-              </a:spcAft>
-              <a:buSzPts val="2000"/>
-              <a:buChar char="●"/>
-            </a:pPr>
-            <a:r>
-              <a:rPr lang="en" sz="2000"/>
-              <a:t>Using Ubuntu on WSL for ROS setup</a:t>
-            </a:r>
-            <a:endParaRPr sz="2000"/>
-          </a:p>
-          <a:p>
-            <a:pPr indent="-355600" lvl="0" marL="457200" rtl="0" algn="l">
-              <a:spcBef>
-                <a:spcPts val="0"/>
-              </a:spcBef>
-              <a:spcAft>
-                <a:spcPts val="0"/>
-              </a:spcAft>
-              <a:buSzPts val="2000"/>
-              <a:buChar char="●"/>
-            </a:pPr>
-            <a:r>
-              <a:rPr lang="en" sz="2000"/>
-              <a:t>Preparing Gazebo model of Solar Panel and simulate</a:t>
-            </a:r>
-            <a:endParaRPr sz="2000"/>
-          </a:p>
-          <a:p>
-            <a:pPr indent="-355600" lvl="0" marL="457200" rtl="0" algn="l">
-              <a:spcBef>
-                <a:spcPts val="0"/>
-              </a:spcBef>
-              <a:spcAft>
-                <a:spcPts val="0"/>
-              </a:spcAft>
-              <a:buSzPts val="2000"/>
-              <a:buChar char="●"/>
-            </a:pPr>
-            <a:r>
-              <a:rPr lang="en" sz="2000"/>
-              <a:t>Motor control code Setup</a:t>
-            </a:r>
-            <a:endParaRPr sz="2000"/>
-          </a:p>
-        </p:txBody>
-      </p:sp>
-    </p:spTree>
-  </p:cSld>
-  <p:clrMapOvr>
-    <a:masterClrMapping/>
-  </p:clrMapOvr>
-  <mc:AlternateContent>
-    <mc:Choice Requires="p14">
-      <p:transition spd="slow" p14:dur="1000">
-        <p14:flip dir="l"/>
-      </p:transition>
-    </mc:Choice>
-    <mc:Fallback>
-      <p:transition spd="slow">
-        <p:fade/>
-      </p:transition>
-    </mc:Fallback>
-  </mc:AlternateContent>
-</p:sld>
-</file>
-
-<file path=ppt/slides/slide3.xml><?xml version="1.0" encoding="utf-8"?>
-<p:sld xmlns:a="http://schemas.openxmlformats.org/drawingml/2006/main" xmlns:r="http://schemas.openxmlformats.org/officeDocument/2006/relationships" xmlns:mc="http://schemas.openxmlformats.org/markup-compatibility/2006" xmlns:mv="urn:schemas-microsoft-com:mac:vml" xmlns:p="http://schemas.openxmlformats.org/presentationml/2006/main" xmlns:c="http://schemas.openxmlformats.org/drawingml/2006/chart" xmlns:dgm="http://schemas.openxmlformats.org/drawingml/2006/diagram" xmlns:o="urn:schemas-microsoft-com:office:office" xmlns:v="urn:schemas-microsoft-com:vml" xmlns:pvml="urn:schemas-microsoft-com:office:powerpoint" xmlns:com="http://schemas.openxmlformats.org/drawingml/2006/compatibility" xmlns:p14="http://schemas.microsoft.com/office/powerpoint/2010/main" xmlns:p15="http://schemas.microsoft.com/office/powerpoint/2012/main" xmlns:ahyp="http://schemas.microsoft.com/office/drawing/2018/hyperlinkcolor">
-  <p:cSld>
-    <p:bg>
-      <p:bgPr>
-        <a:solidFill>
-          <a:schemeClr val="lt1"/>
-        </a:solidFill>
-      </p:bgPr>
-    </p:bg>
-    <p:spTree>
-      <p:nvGrpSpPr>
-        <p:cNvPr id="145" name="Shape 145"/>
-        <p:cNvGrpSpPr/>
-        <p:nvPr/>
-      </p:nvGrpSpPr>
-      <p:grpSpPr>
-        <a:xfrm>
-          <a:off x="0" y="0"/>
-          <a:ext cx="0" cy="0"/>
-          <a:chOff x="0" y="0"/>
-          <a:chExt cx="0" cy="0"/>
-        </a:xfrm>
-      </p:grpSpPr>
-      <p:sp>
-        <p:nvSpPr>
-          <p:cNvPr id="146" name="Google Shape;146;p15"/>
           <p:cNvSpPr/>
           <p:nvPr/>
         </p:nvSpPr>
@@ -9569,7 +9592,7 @@
       </p:sp>
       <p:sp>
         <p:nvSpPr>
-          <p:cNvPr id="147" name="Google Shape;147;p15"/>
+          <p:cNvPr id="141" name="Google Shape;141;p14"/>
           <p:cNvSpPr/>
           <p:nvPr/>
         </p:nvSpPr>
@@ -9627,7 +9650,7 @@
       </p:sp>
       <p:sp>
         <p:nvSpPr>
-          <p:cNvPr id="148" name="Google Shape;148;p15"/>
+          <p:cNvPr id="142" name="Google Shape;142;p14"/>
           <p:cNvSpPr/>
           <p:nvPr/>
         </p:nvSpPr>
@@ -9685,7 +9708,7 @@
       </p:sp>
       <p:sp>
         <p:nvSpPr>
-          <p:cNvPr id="149" name="Google Shape;149;p15"/>
+          <p:cNvPr id="143" name="Google Shape;143;p14"/>
           <p:cNvSpPr/>
           <p:nvPr/>
         </p:nvSpPr>
@@ -9743,7 +9766,7 @@
       </p:sp>
       <p:sp>
         <p:nvSpPr>
-          <p:cNvPr id="150" name="Google Shape;150;p15"/>
+          <p:cNvPr id="144" name="Google Shape;144;p14"/>
           <p:cNvSpPr/>
           <p:nvPr/>
         </p:nvSpPr>
@@ -9801,7 +9824,7 @@
       </p:sp>
       <p:sp>
         <p:nvSpPr>
-          <p:cNvPr id="151" name="Google Shape;151;p15"/>
+          <p:cNvPr id="145" name="Google Shape;145;p14"/>
           <p:cNvSpPr/>
           <p:nvPr/>
         </p:nvSpPr>
@@ -9859,7 +9882,7 @@
       </p:sp>
       <p:sp>
         <p:nvSpPr>
-          <p:cNvPr id="152" name="Google Shape;152;p15"/>
+          <p:cNvPr id="146" name="Google Shape;146;p14"/>
           <p:cNvSpPr/>
           <p:nvPr/>
         </p:nvSpPr>
@@ -9917,10 +9940,10 @@
       </p:sp>
       <p:cxnSp>
         <p:nvCxnSpPr>
-          <p:cNvPr id="153" name="Google Shape;153;p15"/>
+          <p:cNvPr id="147" name="Google Shape;147;p14"/>
           <p:cNvCxnSpPr>
-            <a:stCxn id="146" idx="2"/>
-            <a:endCxn id="147" idx="0"/>
+            <a:stCxn id="140" idx="2"/>
+            <a:endCxn id="141" idx="0"/>
           </p:cNvCxnSpPr>
           <p:nvPr/>
         </p:nvCxnSpPr>
@@ -9948,10 +9971,10 @@
       </p:cxnSp>
       <p:cxnSp>
         <p:nvCxnSpPr>
-          <p:cNvPr id="154" name="Google Shape;154;p15"/>
+          <p:cNvPr id="148" name="Google Shape;148;p14"/>
           <p:cNvCxnSpPr>
-            <a:stCxn id="148" idx="0"/>
-            <a:endCxn id="146" idx="2"/>
+            <a:stCxn id="142" idx="0"/>
+            <a:endCxn id="140" idx="2"/>
           </p:cNvCxnSpPr>
           <p:nvPr/>
         </p:nvCxnSpPr>
@@ -9979,10 +10002,10 @@
       </p:cxnSp>
       <p:cxnSp>
         <p:nvCxnSpPr>
-          <p:cNvPr id="155" name="Google Shape;155;p15"/>
+          <p:cNvPr id="149" name="Google Shape;149;p14"/>
           <p:cNvCxnSpPr>
-            <a:stCxn id="148" idx="2"/>
-            <a:endCxn id="150" idx="0"/>
+            <a:stCxn id="142" idx="2"/>
+            <a:endCxn id="144" idx="0"/>
           </p:cNvCxnSpPr>
           <p:nvPr/>
         </p:nvCxnSpPr>
@@ -10010,10 +10033,10 @@
       </p:cxnSp>
       <p:cxnSp>
         <p:nvCxnSpPr>
-          <p:cNvPr id="156" name="Google Shape;156;p15"/>
+          <p:cNvPr id="150" name="Google Shape;150;p14"/>
           <p:cNvCxnSpPr>
-            <a:stCxn id="149" idx="0"/>
-            <a:endCxn id="148" idx="2"/>
+            <a:stCxn id="143" idx="0"/>
+            <a:endCxn id="142" idx="2"/>
           </p:cNvCxnSpPr>
           <p:nvPr/>
         </p:nvCxnSpPr>
@@ -10041,10 +10064,10 @@
       </p:cxnSp>
       <p:cxnSp>
         <p:nvCxnSpPr>
-          <p:cNvPr id="157" name="Google Shape;157;p15"/>
+          <p:cNvPr id="151" name="Google Shape;151;p14"/>
           <p:cNvCxnSpPr>
-            <a:stCxn id="147" idx="2"/>
-            <a:endCxn id="152" idx="0"/>
+            <a:stCxn id="141" idx="2"/>
+            <a:endCxn id="146" idx="0"/>
           </p:cNvCxnSpPr>
           <p:nvPr/>
         </p:nvCxnSpPr>
@@ -10072,10 +10095,10 @@
       </p:cxnSp>
       <p:cxnSp>
         <p:nvCxnSpPr>
-          <p:cNvPr id="158" name="Google Shape;158;p15"/>
+          <p:cNvPr id="152" name="Google Shape;152;p14"/>
           <p:cNvCxnSpPr>
-            <a:stCxn id="151" idx="0"/>
-            <a:endCxn id="147" idx="2"/>
+            <a:stCxn id="145" idx="0"/>
+            <a:endCxn id="141" idx="2"/>
           </p:cNvCxnSpPr>
           <p:nvPr/>
         </p:nvCxnSpPr>
@@ -10103,7 +10126,7 @@
       </p:cxnSp>
       <p:sp>
         <p:nvSpPr>
-          <p:cNvPr id="159" name="Google Shape;159;p15"/>
+          <p:cNvPr id="153" name="Google Shape;153;p14"/>
           <p:cNvSpPr/>
           <p:nvPr/>
         </p:nvSpPr>
@@ -10161,7 +10184,7 @@
       </p:sp>
       <p:sp>
         <p:nvSpPr>
-          <p:cNvPr id="160" name="Google Shape;160;p15"/>
+          <p:cNvPr id="154" name="Google Shape;154;p14"/>
           <p:cNvSpPr/>
           <p:nvPr/>
         </p:nvSpPr>
@@ -10219,7 +10242,7 @@
       </p:sp>
       <p:sp>
         <p:nvSpPr>
-          <p:cNvPr id="161" name="Google Shape;161;p15"/>
+          <p:cNvPr id="155" name="Google Shape;155;p14"/>
           <p:cNvSpPr/>
           <p:nvPr/>
         </p:nvSpPr>
@@ -10277,7 +10300,7 @@
       </p:sp>
       <p:sp>
         <p:nvSpPr>
-          <p:cNvPr id="162" name="Google Shape;162;p15"/>
+          <p:cNvPr id="156" name="Google Shape;156;p14"/>
           <p:cNvSpPr/>
           <p:nvPr/>
         </p:nvSpPr>
@@ -10335,7 +10358,7 @@
       </p:sp>
       <p:sp>
         <p:nvSpPr>
-          <p:cNvPr id="163" name="Google Shape;163;p15"/>
+          <p:cNvPr id="157" name="Google Shape;157;p14"/>
           <p:cNvSpPr/>
           <p:nvPr/>
         </p:nvSpPr>
@@ -10393,10 +10416,10 @@
       </p:sp>
       <p:cxnSp>
         <p:nvCxnSpPr>
-          <p:cNvPr id="164" name="Google Shape;164;p15"/>
+          <p:cNvPr id="158" name="Google Shape;158;p14"/>
           <p:cNvCxnSpPr>
-            <a:stCxn id="159" idx="0"/>
-            <a:endCxn id="149" idx="2"/>
+            <a:stCxn id="153" idx="0"/>
+            <a:endCxn id="143" idx="2"/>
           </p:cNvCxnSpPr>
           <p:nvPr/>
         </p:nvCxnSpPr>
@@ -10424,10 +10447,10 @@
       </p:cxnSp>
       <p:cxnSp>
         <p:nvCxnSpPr>
-          <p:cNvPr id="165" name="Google Shape;165;p15"/>
+          <p:cNvPr id="159" name="Google Shape;159;p14"/>
           <p:cNvCxnSpPr>
-            <a:stCxn id="160" idx="0"/>
-            <a:endCxn id="149" idx="2"/>
+            <a:stCxn id="154" idx="0"/>
+            <a:endCxn id="143" idx="2"/>
           </p:cNvCxnSpPr>
           <p:nvPr/>
         </p:nvCxnSpPr>
@@ -10455,10 +10478,10 @@
       </p:cxnSp>
       <p:cxnSp>
         <p:nvCxnSpPr>
-          <p:cNvPr id="166" name="Google Shape;166;p15"/>
+          <p:cNvPr id="160" name="Google Shape;160;p14"/>
           <p:cNvCxnSpPr>
-            <a:stCxn id="161" idx="0"/>
-            <a:endCxn id="151" idx="2"/>
+            <a:stCxn id="155" idx="0"/>
+            <a:endCxn id="145" idx="2"/>
           </p:cNvCxnSpPr>
           <p:nvPr/>
         </p:nvCxnSpPr>
@@ -10486,10 +10509,10 @@
       </p:cxnSp>
       <p:cxnSp>
         <p:nvCxnSpPr>
-          <p:cNvPr id="167" name="Google Shape;167;p15"/>
+          <p:cNvPr id="161" name="Google Shape;161;p14"/>
           <p:cNvCxnSpPr>
-            <a:stCxn id="162" idx="0"/>
-            <a:endCxn id="151" idx="2"/>
+            <a:stCxn id="156" idx="0"/>
+            <a:endCxn id="145" idx="2"/>
           </p:cNvCxnSpPr>
           <p:nvPr/>
         </p:nvCxnSpPr>
@@ -10517,10 +10540,10 @@
       </p:cxnSp>
       <p:cxnSp>
         <p:nvCxnSpPr>
-          <p:cNvPr id="168" name="Google Shape;168;p15"/>
+          <p:cNvPr id="162" name="Google Shape;162;p14"/>
           <p:cNvCxnSpPr>
-            <a:stCxn id="163" idx="0"/>
-            <a:endCxn id="152" idx="2"/>
+            <a:stCxn id="157" idx="0"/>
+            <a:endCxn id="146" idx="2"/>
           </p:cNvCxnSpPr>
           <p:nvPr/>
         </p:nvCxnSpPr>
@@ -10548,7 +10571,7 @@
       </p:cxnSp>
       <p:sp>
         <p:nvSpPr>
-          <p:cNvPr id="169" name="Google Shape;169;p15"/>
+          <p:cNvPr id="163" name="Google Shape;163;p14"/>
           <p:cNvSpPr/>
           <p:nvPr/>
         </p:nvSpPr>
@@ -10606,7 +10629,7 @@
       </p:sp>
       <p:sp>
         <p:nvSpPr>
-          <p:cNvPr id="170" name="Google Shape;170;p15"/>
+          <p:cNvPr id="164" name="Google Shape;164;p14"/>
           <p:cNvSpPr/>
           <p:nvPr/>
         </p:nvSpPr>
@@ -10664,7 +10687,7 @@
       </p:sp>
       <p:sp>
         <p:nvSpPr>
-          <p:cNvPr id="171" name="Google Shape;171;p15"/>
+          <p:cNvPr id="165" name="Google Shape;165;p14"/>
           <p:cNvSpPr/>
           <p:nvPr/>
         </p:nvSpPr>
@@ -10722,7 +10745,7 @@
       </p:sp>
       <p:sp>
         <p:nvSpPr>
-          <p:cNvPr id="172" name="Google Shape;172;p15"/>
+          <p:cNvPr id="166" name="Google Shape;166;p14"/>
           <p:cNvSpPr/>
           <p:nvPr/>
         </p:nvSpPr>
@@ -10780,7 +10803,7 @@
       </p:sp>
       <p:sp>
         <p:nvSpPr>
-          <p:cNvPr id="173" name="Google Shape;173;p15"/>
+          <p:cNvPr id="167" name="Google Shape;167;p14"/>
           <p:cNvSpPr/>
           <p:nvPr/>
         </p:nvSpPr>
@@ -10838,7 +10861,7 @@
       </p:sp>
       <p:sp>
         <p:nvSpPr>
-          <p:cNvPr id="174" name="Google Shape;174;p15"/>
+          <p:cNvPr id="168" name="Google Shape;168;p14"/>
           <p:cNvSpPr/>
           <p:nvPr/>
         </p:nvSpPr>
@@ -10896,7 +10919,7 @@
       </p:sp>
       <p:sp>
         <p:nvSpPr>
-          <p:cNvPr id="175" name="Google Shape;175;p15"/>
+          <p:cNvPr id="169" name="Google Shape;169;p14"/>
           <p:cNvSpPr/>
           <p:nvPr/>
         </p:nvSpPr>
@@ -10954,10 +10977,10 @@
       </p:sp>
       <p:cxnSp>
         <p:nvCxnSpPr>
-          <p:cNvPr id="176" name="Google Shape;176;p15"/>
+          <p:cNvPr id="170" name="Google Shape;170;p14"/>
           <p:cNvCxnSpPr>
-            <a:stCxn id="169" idx="2"/>
-            <a:endCxn id="170" idx="0"/>
+            <a:stCxn id="163" idx="2"/>
+            <a:endCxn id="164" idx="0"/>
           </p:cNvCxnSpPr>
           <p:nvPr/>
         </p:nvCxnSpPr>
@@ -10985,10 +11008,10 @@
       </p:cxnSp>
       <p:cxnSp>
         <p:nvCxnSpPr>
-          <p:cNvPr id="177" name="Google Shape;177;p15"/>
+          <p:cNvPr id="171" name="Google Shape;171;p14"/>
           <p:cNvCxnSpPr>
-            <a:stCxn id="171" idx="0"/>
-            <a:endCxn id="169" idx="2"/>
+            <a:stCxn id="165" idx="0"/>
+            <a:endCxn id="163" idx="2"/>
           </p:cNvCxnSpPr>
           <p:nvPr/>
         </p:nvCxnSpPr>
@@ -11016,10 +11039,10 @@
       </p:cxnSp>
       <p:cxnSp>
         <p:nvCxnSpPr>
-          <p:cNvPr id="178" name="Google Shape;178;p15"/>
+          <p:cNvPr id="172" name="Google Shape;172;p14"/>
           <p:cNvCxnSpPr>
-            <a:stCxn id="171" idx="2"/>
-            <a:endCxn id="173" idx="0"/>
+            <a:stCxn id="165" idx="2"/>
+            <a:endCxn id="167" idx="0"/>
           </p:cNvCxnSpPr>
           <p:nvPr/>
         </p:nvCxnSpPr>
@@ -11047,10 +11070,10 @@
       </p:cxnSp>
       <p:cxnSp>
         <p:nvCxnSpPr>
-          <p:cNvPr id="179" name="Google Shape;179;p15"/>
+          <p:cNvPr id="173" name="Google Shape;173;p14"/>
           <p:cNvCxnSpPr>
-            <a:stCxn id="172" idx="0"/>
-            <a:endCxn id="171" idx="2"/>
+            <a:stCxn id="166" idx="0"/>
+            <a:endCxn id="165" idx="2"/>
           </p:cNvCxnSpPr>
           <p:nvPr/>
         </p:nvCxnSpPr>
@@ -11078,10 +11101,10 @@
       </p:cxnSp>
       <p:cxnSp>
         <p:nvCxnSpPr>
-          <p:cNvPr id="180" name="Google Shape;180;p15"/>
+          <p:cNvPr id="174" name="Google Shape;174;p14"/>
           <p:cNvCxnSpPr>
-            <a:stCxn id="170" idx="2"/>
-            <a:endCxn id="175" idx="0"/>
+            <a:stCxn id="164" idx="2"/>
+            <a:endCxn id="169" idx="0"/>
           </p:cNvCxnSpPr>
           <p:nvPr/>
         </p:nvCxnSpPr>
@@ -11109,10 +11132,10 @@
       </p:cxnSp>
       <p:cxnSp>
         <p:nvCxnSpPr>
-          <p:cNvPr id="181" name="Google Shape;181;p15"/>
+          <p:cNvPr id="175" name="Google Shape;175;p14"/>
           <p:cNvCxnSpPr>
-            <a:stCxn id="174" idx="0"/>
-            <a:endCxn id="170" idx="2"/>
+            <a:stCxn id="168" idx="0"/>
+            <a:endCxn id="164" idx="2"/>
           </p:cNvCxnSpPr>
           <p:nvPr/>
         </p:nvCxnSpPr>
@@ -11140,7 +11163,7 @@
       </p:cxnSp>
       <p:sp>
         <p:nvSpPr>
-          <p:cNvPr id="182" name="Google Shape;182;p15"/>
+          <p:cNvPr id="176" name="Google Shape;176;p14"/>
           <p:cNvSpPr/>
           <p:nvPr/>
         </p:nvSpPr>
@@ -11198,7 +11221,7 @@
       </p:sp>
       <p:sp>
         <p:nvSpPr>
-          <p:cNvPr id="183" name="Google Shape;183;p15"/>
+          <p:cNvPr id="177" name="Google Shape;177;p14"/>
           <p:cNvSpPr/>
           <p:nvPr/>
         </p:nvSpPr>
@@ -11256,7 +11279,7 @@
       </p:sp>
       <p:sp>
         <p:nvSpPr>
-          <p:cNvPr id="184" name="Google Shape;184;p15"/>
+          <p:cNvPr id="178" name="Google Shape;178;p14"/>
           <p:cNvSpPr/>
           <p:nvPr/>
         </p:nvSpPr>
@@ -11314,7 +11337,7 @@
       </p:sp>
       <p:sp>
         <p:nvSpPr>
-          <p:cNvPr id="185" name="Google Shape;185;p15"/>
+          <p:cNvPr id="179" name="Google Shape;179;p14"/>
           <p:cNvSpPr/>
           <p:nvPr/>
         </p:nvSpPr>
@@ -11372,7 +11395,7 @@
       </p:sp>
       <p:sp>
         <p:nvSpPr>
-          <p:cNvPr id="186" name="Google Shape;186;p15"/>
+          <p:cNvPr id="180" name="Google Shape;180;p14"/>
           <p:cNvSpPr/>
           <p:nvPr/>
         </p:nvSpPr>
@@ -11430,10 +11453,10 @@
       </p:sp>
       <p:cxnSp>
         <p:nvCxnSpPr>
-          <p:cNvPr id="187" name="Google Shape;187;p15"/>
+          <p:cNvPr id="181" name="Google Shape;181;p14"/>
           <p:cNvCxnSpPr>
-            <a:stCxn id="182" idx="0"/>
-            <a:endCxn id="172" idx="2"/>
+            <a:stCxn id="176" idx="0"/>
+            <a:endCxn id="166" idx="2"/>
           </p:cNvCxnSpPr>
           <p:nvPr/>
         </p:nvCxnSpPr>
@@ -11461,10 +11484,10 @@
       </p:cxnSp>
       <p:cxnSp>
         <p:nvCxnSpPr>
-          <p:cNvPr id="188" name="Google Shape;188;p15"/>
+          <p:cNvPr id="182" name="Google Shape;182;p14"/>
           <p:cNvCxnSpPr>
-            <a:stCxn id="183" idx="0"/>
-            <a:endCxn id="172" idx="2"/>
+            <a:stCxn id="177" idx="0"/>
+            <a:endCxn id="166" idx="2"/>
           </p:cNvCxnSpPr>
           <p:nvPr/>
         </p:nvCxnSpPr>
@@ -11492,10 +11515,10 @@
       </p:cxnSp>
       <p:cxnSp>
         <p:nvCxnSpPr>
-          <p:cNvPr id="189" name="Google Shape;189;p15"/>
+          <p:cNvPr id="183" name="Google Shape;183;p14"/>
           <p:cNvCxnSpPr>
-            <a:stCxn id="184" idx="0"/>
-            <a:endCxn id="174" idx="2"/>
+            <a:stCxn id="178" idx="0"/>
+            <a:endCxn id="168" idx="2"/>
           </p:cNvCxnSpPr>
           <p:nvPr/>
         </p:nvCxnSpPr>
@@ -11523,10 +11546,10 @@
       </p:cxnSp>
       <p:cxnSp>
         <p:nvCxnSpPr>
-          <p:cNvPr id="190" name="Google Shape;190;p15"/>
+          <p:cNvPr id="184" name="Google Shape;184;p14"/>
           <p:cNvCxnSpPr>
-            <a:stCxn id="185" idx="0"/>
-            <a:endCxn id="174" idx="2"/>
+            <a:stCxn id="179" idx="0"/>
+            <a:endCxn id="168" idx="2"/>
           </p:cNvCxnSpPr>
           <p:nvPr/>
         </p:nvCxnSpPr>
@@ -11554,10 +11577,10 @@
       </p:cxnSp>
       <p:cxnSp>
         <p:nvCxnSpPr>
-          <p:cNvPr id="191" name="Google Shape;191;p15"/>
+          <p:cNvPr id="185" name="Google Shape;185;p14"/>
           <p:cNvCxnSpPr>
-            <a:stCxn id="186" idx="0"/>
-            <a:endCxn id="175" idx="2"/>
+            <a:stCxn id="180" idx="0"/>
+            <a:endCxn id="169" idx="2"/>
           </p:cNvCxnSpPr>
           <p:nvPr/>
         </p:nvCxnSpPr>
@@ -11634,7 +11657,7 @@
                                           </p:stCondLst>
                                         </p:cTn>
                                         <p:tgtEl>
-                                          <p:spTgt spid="171">
+                                          <p:spTgt spid="165">
                                             <p:txEl>
                                               <p:pRg end="0" st="0"/>
                                             </p:txEl>
@@ -11652,7 +11675,7 @@
                                       <p:cBhvr>
                                         <p:cTn dur="1000"/>
                                         <p:tgtEl>
-                                          <p:spTgt spid="171">
+                                          <p:spTgt spid="165">
                                             <p:txEl>
                                               <p:pRg end="0" st="0"/>
                                             </p:txEl>
@@ -11695,7 +11718,7 @@
                                           </p:stCondLst>
                                         </p:cTn>
                                         <p:tgtEl>
-                                          <p:spTgt spid="170">
+                                          <p:spTgt spid="164">
                                             <p:txEl>
                                               <p:pRg end="0" st="0"/>
                                             </p:txEl>
@@ -11713,7 +11736,7 @@
                                       <p:cBhvr>
                                         <p:cTn dur="1000"/>
                                         <p:tgtEl>
-                                          <p:spTgt spid="170">
+                                          <p:spTgt spid="164">
                                             <p:txEl>
                                               <p:pRg end="0" st="0"/>
                                             </p:txEl>
@@ -11756,7 +11779,7 @@
                                           </p:stCondLst>
                                         </p:cTn>
                                         <p:tgtEl>
-                                          <p:spTgt spid="172">
+                                          <p:spTgt spid="166">
                                             <p:txEl>
                                               <p:pRg end="0" st="0"/>
                                             </p:txEl>
@@ -11774,7 +11797,7 @@
                                       <p:cBhvr>
                                         <p:cTn dur="1000"/>
                                         <p:tgtEl>
-                                          <p:spTgt spid="172">
+                                          <p:spTgt spid="166">
                                             <p:txEl>
                                               <p:pRg end="0" st="0"/>
                                             </p:txEl>
@@ -11817,7 +11840,7 @@
                                           </p:stCondLst>
                                         </p:cTn>
                                         <p:tgtEl>
-                                          <p:spTgt spid="173">
+                                          <p:spTgt spid="167">
                                             <p:txEl>
                                               <p:pRg end="0" st="0"/>
                                             </p:txEl>
@@ -11835,7 +11858,7 @@
                                       <p:cBhvr>
                                         <p:cTn dur="1000"/>
                                         <p:tgtEl>
-                                          <p:spTgt spid="173">
+                                          <p:spTgt spid="167">
                                             <p:txEl>
                                               <p:pRg end="0" st="0"/>
                                             </p:txEl>
@@ -11878,7 +11901,7 @@
                                           </p:stCondLst>
                                         </p:cTn>
                                         <p:tgtEl>
-                                          <p:spTgt spid="182">
+                                          <p:spTgt spid="176">
                                             <p:txEl>
                                               <p:pRg end="0" st="0"/>
                                             </p:txEl>
@@ -11896,7 +11919,7 @@
                                       <p:cBhvr>
                                         <p:cTn dur="1000"/>
                                         <p:tgtEl>
-                                          <p:spTgt spid="182">
+                                          <p:spTgt spid="176">
                                             <p:txEl>
                                               <p:pRg end="0" st="0"/>
                                             </p:txEl>
@@ -11939,7 +11962,7 @@
                                           </p:stCondLst>
                                         </p:cTn>
                                         <p:tgtEl>
-                                          <p:spTgt spid="183">
+                                          <p:spTgt spid="177">
                                             <p:txEl>
                                               <p:pRg end="0" st="0"/>
                                             </p:txEl>
@@ -11957,7 +11980,7 @@
                                       <p:cBhvr>
                                         <p:cTn dur="1000"/>
                                         <p:tgtEl>
-                                          <p:spTgt spid="183">
+                                          <p:spTgt spid="177">
                                             <p:txEl>
                                               <p:pRg end="0" st="0"/>
                                             </p:txEl>
@@ -12000,7 +12023,7 @@
                                           </p:stCondLst>
                                         </p:cTn>
                                         <p:tgtEl>
-                                          <p:spTgt spid="174">
+                                          <p:spTgt spid="168">
                                             <p:txEl>
                                               <p:pRg end="0" st="0"/>
                                             </p:txEl>
@@ -12018,7 +12041,7 @@
                                       <p:cBhvr>
                                         <p:cTn dur="1000"/>
                                         <p:tgtEl>
-                                          <p:spTgt spid="174">
+                                          <p:spTgt spid="168">
                                             <p:txEl>
                                               <p:pRg end="0" st="0"/>
                                             </p:txEl>
@@ -12061,7 +12084,7 @@
                                           </p:stCondLst>
                                         </p:cTn>
                                         <p:tgtEl>
-                                          <p:spTgt spid="175">
+                                          <p:spTgt spid="169">
                                             <p:txEl>
                                               <p:pRg end="0" st="0"/>
                                             </p:txEl>
@@ -12079,7 +12102,7 @@
                                       <p:cBhvr>
                                         <p:cTn dur="1000"/>
                                         <p:tgtEl>
-                                          <p:spTgt spid="175">
+                                          <p:spTgt spid="169">
                                             <p:txEl>
                                               <p:pRg end="0" st="0"/>
                                             </p:txEl>
@@ -12122,7 +12145,7 @@
                                           </p:stCondLst>
                                         </p:cTn>
                                         <p:tgtEl>
-                                          <p:spTgt spid="184">
+                                          <p:spTgt spid="178">
                                             <p:txEl>
                                               <p:pRg end="0" st="0"/>
                                             </p:txEl>
@@ -12140,7 +12163,7 @@
                                       <p:cBhvr>
                                         <p:cTn dur="1000"/>
                                         <p:tgtEl>
-                                          <p:spTgt spid="184">
+                                          <p:spTgt spid="178">
                                             <p:txEl>
                                               <p:pRg end="0" st="0"/>
                                             </p:txEl>
@@ -12183,7 +12206,7 @@
                                           </p:stCondLst>
                                         </p:cTn>
                                         <p:tgtEl>
-                                          <p:spTgt spid="185">
+                                          <p:spTgt spid="179">
                                             <p:txEl>
                                               <p:pRg end="0" st="0"/>
                                             </p:txEl>
@@ -12201,7 +12224,7 @@
                                       <p:cBhvr>
                                         <p:cTn dur="1000"/>
                                         <p:tgtEl>
-                                          <p:spTgt spid="185">
+                                          <p:spTgt spid="179">
                                             <p:txEl>
                                               <p:pRg end="0" st="0"/>
                                             </p:txEl>
@@ -12244,7 +12267,7 @@
                                           </p:stCondLst>
                                         </p:cTn>
                                         <p:tgtEl>
-                                          <p:spTgt spid="186">
+                                          <p:spTgt spid="180">
                                             <p:txEl>
                                               <p:pRg end="0" st="0"/>
                                             </p:txEl>
@@ -12262,7 +12285,7 @@
                                       <p:cBhvr>
                                         <p:cTn dur="1000"/>
                                         <p:tgtEl>
-                                          <p:spTgt spid="186">
+                                          <p:spTgt spid="180">
                                             <p:txEl>
                                               <p:pRg end="0" st="0"/>
                                             </p:txEl>
@@ -12270,6 +12293,1358 @@
                                         </p:tgtEl>
                                       </p:cBhvr>
                                     </p:animEffect>
+                                  </p:childTnLst>
+                                </p:cTn>
+                              </p:par>
+                            </p:childTnLst>
+                          </p:cTn>
+                        </p:par>
+                      </p:childTnLst>
+                    </p:cTn>
+                  </p:par>
+                </p:childTnLst>
+              </p:cTn>
+              <p:prevCondLst>
+                <p:cond evt="onPrev">
+                  <p:tgtEl>
+                    <p:sldTgt/>
+                  </p:tgtEl>
+                </p:cond>
+              </p:prevCondLst>
+              <p:nextCondLst>
+                <p:cond evt="onNext">
+                  <p:tgtEl>
+                    <p:sldTgt/>
+                  </p:tgtEl>
+                </p:cond>
+              </p:nextCondLst>
+            </p:seq>
+          </p:childTnLst>
+        </p:cTn>
+      </p:par>
+    </p:tnLst>
+  </p:timing>
+</p:sld>
+</file>
+
+<file path=ppt/slides/slide3.xml><?xml version="1.0" encoding="utf-8"?>
+<p:sld xmlns:a="http://schemas.openxmlformats.org/drawingml/2006/main" xmlns:r="http://schemas.openxmlformats.org/officeDocument/2006/relationships" xmlns:mc="http://schemas.openxmlformats.org/markup-compatibility/2006" xmlns:mv="urn:schemas-microsoft-com:mac:vml" xmlns:p="http://schemas.openxmlformats.org/presentationml/2006/main" xmlns:c="http://schemas.openxmlformats.org/drawingml/2006/chart" xmlns:dgm="http://schemas.openxmlformats.org/drawingml/2006/diagram" xmlns:o="urn:schemas-microsoft-com:office:office" xmlns:v="urn:schemas-microsoft-com:vml" xmlns:pvml="urn:schemas-microsoft-com:office:powerpoint" xmlns:com="http://schemas.openxmlformats.org/drawingml/2006/compatibility" xmlns:p14="http://schemas.microsoft.com/office/powerpoint/2010/main" xmlns:p15="http://schemas.microsoft.com/office/powerpoint/2012/main" xmlns:ahyp="http://schemas.microsoft.com/office/drawing/2018/hyperlinkcolor">
+  <p:cSld>
+    <p:spTree>
+      <p:nvGrpSpPr>
+        <p:cNvPr id="189" name="Shape 189"/>
+        <p:cNvGrpSpPr/>
+        <p:nvPr/>
+      </p:nvGrpSpPr>
+      <p:grpSpPr>
+        <a:xfrm>
+          <a:off x="0" y="0"/>
+          <a:ext cx="0" cy="0"/>
+          <a:chOff x="0" y="0"/>
+          <a:chExt cx="0" cy="0"/>
+        </a:xfrm>
+      </p:grpSpPr>
+      <p:sp>
+        <p:nvSpPr>
+          <p:cNvPr id="190" name="Google Shape;190;p15"/>
+          <p:cNvSpPr txBox="1"/>
+          <p:nvPr>
+            <p:ph type="title"/>
+          </p:nvPr>
+        </p:nvSpPr>
+        <p:spPr>
+          <a:xfrm>
+            <a:off x="1297500" y="393750"/>
+            <a:ext cx="7038900" cy="914100"/>
+          </a:xfrm>
+          <a:prstGeom prst="rect">
+            <a:avLst/>
+          </a:prstGeom>
+        </p:spPr>
+        <p:txBody>
+          <a:bodyPr anchorCtr="0" anchor="t" bIns="91425" lIns="91425" spcFirstLastPara="1" rIns="91425" wrap="square" tIns="91425">
+            <a:normAutofit/>
+          </a:bodyPr>
+          <a:lstStyle/>
+          <a:p>
+            <a:pPr indent="0" lvl="0" marL="0" rtl="0" algn="l">
+              <a:spcBef>
+                <a:spcPts val="0"/>
+              </a:spcBef>
+              <a:spcAft>
+                <a:spcPts val="0"/>
+              </a:spcAft>
+              <a:buNone/>
+            </a:pPr>
+            <a:r>
+              <a:rPr lang="en" sz="3000"/>
+              <a:t>Targets to accomplish</a:t>
+            </a:r>
+            <a:endParaRPr sz="3000"/>
+          </a:p>
+        </p:txBody>
+      </p:sp>
+      <p:sp>
+        <p:nvSpPr>
+          <p:cNvPr id="191" name="Google Shape;191;p15"/>
+          <p:cNvSpPr txBox="1"/>
+          <p:nvPr>
+            <p:ph idx="1" type="body"/>
+          </p:nvPr>
+        </p:nvSpPr>
+        <p:spPr>
+          <a:xfrm>
+            <a:off x="1297500" y="1567550"/>
+            <a:ext cx="7038900" cy="2911200"/>
+          </a:xfrm>
+          <a:prstGeom prst="rect">
+            <a:avLst/>
+          </a:prstGeom>
+        </p:spPr>
+        <p:txBody>
+          <a:bodyPr anchorCtr="0" anchor="t" bIns="91425" lIns="91425" spcFirstLastPara="1" rIns="91425" wrap="square" tIns="91425">
+            <a:normAutofit/>
+          </a:bodyPr>
+          <a:lstStyle/>
+          <a:p>
+            <a:pPr indent="-355600" lvl="0" marL="457200" rtl="0" algn="l">
+              <a:spcBef>
+                <a:spcPts val="0"/>
+              </a:spcBef>
+              <a:spcAft>
+                <a:spcPts val="0"/>
+              </a:spcAft>
+              <a:buSzPts val="2000"/>
+              <a:buChar char="●"/>
+            </a:pPr>
+            <a:r>
+              <a:rPr lang="en" sz="2000"/>
+              <a:t>Using </a:t>
+            </a:r>
+            <a:r>
+              <a:rPr i="1" lang="en" sz="2000"/>
+              <a:t>do_mpc</a:t>
+            </a:r>
+            <a:r>
+              <a:rPr lang="en" sz="2000"/>
+              <a:t> python library for optimization</a:t>
+            </a:r>
+            <a:endParaRPr sz="2000"/>
+          </a:p>
+          <a:p>
+            <a:pPr indent="-355600" lvl="0" marL="457200" rtl="0" algn="l">
+              <a:spcBef>
+                <a:spcPts val="0"/>
+              </a:spcBef>
+              <a:spcAft>
+                <a:spcPts val="0"/>
+              </a:spcAft>
+              <a:buSzPts val="2000"/>
+              <a:buChar char="●"/>
+            </a:pPr>
+            <a:r>
+              <a:rPr lang="en" sz="2000"/>
+              <a:t>Using Ubuntu on WSL for ROS setup</a:t>
+            </a:r>
+            <a:endParaRPr sz="2000"/>
+          </a:p>
+          <a:p>
+            <a:pPr indent="-355600" lvl="0" marL="457200" rtl="0" algn="l">
+              <a:spcBef>
+                <a:spcPts val="0"/>
+              </a:spcBef>
+              <a:spcAft>
+                <a:spcPts val="0"/>
+              </a:spcAft>
+              <a:buSzPts val="2000"/>
+              <a:buChar char="●"/>
+            </a:pPr>
+            <a:r>
+              <a:rPr lang="en" sz="2000"/>
+              <a:t>Preparing Gazebo model of Solar Panel and simulate</a:t>
+            </a:r>
+            <a:endParaRPr sz="2000"/>
+          </a:p>
+          <a:p>
+            <a:pPr indent="-355600" lvl="0" marL="457200" rtl="0" algn="l">
+              <a:spcBef>
+                <a:spcPts val="0"/>
+              </a:spcBef>
+              <a:spcAft>
+                <a:spcPts val="0"/>
+              </a:spcAft>
+              <a:buSzPts val="2000"/>
+              <a:buChar char="●"/>
+            </a:pPr>
+            <a:r>
+              <a:rPr lang="en" sz="2000"/>
+              <a:t>Motor control code Setup</a:t>
+            </a:r>
+            <a:endParaRPr sz="2000"/>
+          </a:p>
+        </p:txBody>
+      </p:sp>
+    </p:spTree>
+  </p:cSld>
+  <p:clrMapOvr>
+    <a:masterClrMapping/>
+  </p:clrMapOvr>
+  <mc:AlternateContent>
+    <mc:Choice Requires="p14">
+      <p:transition spd="slow" p14:dur="1000">
+        <p14:flip dir="l"/>
+      </p:transition>
+    </mc:Choice>
+    <mc:Fallback>
+      <p:transition spd="slow">
+        <p:fade/>
+      </p:transition>
+    </mc:Fallback>
+  </mc:AlternateContent>
+  <p:timing>
+    <p:tnLst>
+      <p:par>
+        <p:cTn dur="indefinite" nodeType="tmRoot" restart="never">
+          <p:childTnLst>
+            <p:seq concurrent="1" nextAc="seek">
+              <p:cTn dur="indefinite" id="2" nodeType="mainSeq">
+                <p:childTnLst>
+                  <p:par>
+                    <p:cTn fill="hold">
+                      <p:stCondLst>
+                        <p:cond delay="indefinite"/>
+                      </p:stCondLst>
+                      <p:childTnLst>
+                        <p:par>
+                          <p:cTn fill="hold">
+                            <p:stCondLst>
+                              <p:cond delay="0"/>
+                            </p:stCondLst>
+                            <p:childTnLst>
+                              <p:par>
+                                <p:cTn fill="hold" nodeType="clickEffect" presetClass="entr" presetID="10" presetSubtype="0">
+                                  <p:stCondLst>
+                                    <p:cond delay="0"/>
+                                  </p:stCondLst>
+                                  <p:childTnLst>
+                                    <p:set>
+                                      <p:cBhvr>
+                                        <p:cTn dur="1" fill="hold">
+                                          <p:stCondLst>
+                                            <p:cond delay="0"/>
+                                          </p:stCondLst>
+                                        </p:cTn>
+                                        <p:tgtEl>
+                                          <p:spTgt spid="191">
+                                            <p:txEl>
+                                              <p:pRg end="0" st="0"/>
+                                            </p:txEl>
+                                          </p:spTgt>
+                                        </p:tgtEl>
+                                        <p:attrNameLst>
+                                          <p:attrName>style.visibility</p:attrName>
+                                        </p:attrNameLst>
+                                      </p:cBhvr>
+                                      <p:to>
+                                        <p:strVal val="visible"/>
+                                      </p:to>
+                                    </p:set>
+                                    <p:animEffect filter="fade" transition="in">
+                                      <p:cBhvr>
+                                        <p:cTn dur="500"/>
+                                        <p:tgtEl>
+                                          <p:spTgt spid="191">
+                                            <p:txEl>
+                                              <p:pRg end="0" st="0"/>
+                                            </p:txEl>
+                                          </p:spTgt>
+                                        </p:tgtEl>
+                                      </p:cBhvr>
+                                    </p:animEffect>
+                                  </p:childTnLst>
+                                </p:cTn>
+                              </p:par>
+                            </p:childTnLst>
+                          </p:cTn>
+                        </p:par>
+                      </p:childTnLst>
+                    </p:cTn>
+                  </p:par>
+                  <p:par>
+                    <p:cTn fill="hold">
+                      <p:stCondLst>
+                        <p:cond delay="indefinite"/>
+                      </p:stCondLst>
+                      <p:childTnLst>
+                        <p:par>
+                          <p:cTn fill="hold">
+                            <p:stCondLst>
+                              <p:cond delay="0"/>
+                            </p:stCondLst>
+                            <p:childTnLst>
+                              <p:par>
+                                <p:cTn fill="hold" nodeType="clickEffect" presetClass="entr" presetID="10" presetSubtype="0">
+                                  <p:stCondLst>
+                                    <p:cond delay="0"/>
+                                  </p:stCondLst>
+                                  <p:childTnLst>
+                                    <p:set>
+                                      <p:cBhvr>
+                                        <p:cTn dur="1" fill="hold">
+                                          <p:stCondLst>
+                                            <p:cond delay="0"/>
+                                          </p:stCondLst>
+                                        </p:cTn>
+                                        <p:tgtEl>
+                                          <p:spTgt spid="191">
+                                            <p:txEl>
+                                              <p:pRg end="1" st="1"/>
+                                            </p:txEl>
+                                          </p:spTgt>
+                                        </p:tgtEl>
+                                        <p:attrNameLst>
+                                          <p:attrName>style.visibility</p:attrName>
+                                        </p:attrNameLst>
+                                      </p:cBhvr>
+                                      <p:to>
+                                        <p:strVal val="visible"/>
+                                      </p:to>
+                                    </p:set>
+                                    <p:animEffect filter="fade" transition="in">
+                                      <p:cBhvr>
+                                        <p:cTn dur="500"/>
+                                        <p:tgtEl>
+                                          <p:spTgt spid="191">
+                                            <p:txEl>
+                                              <p:pRg end="1" st="1"/>
+                                            </p:txEl>
+                                          </p:spTgt>
+                                        </p:tgtEl>
+                                      </p:cBhvr>
+                                    </p:animEffect>
+                                  </p:childTnLst>
+                                </p:cTn>
+                              </p:par>
+                            </p:childTnLst>
+                          </p:cTn>
+                        </p:par>
+                      </p:childTnLst>
+                    </p:cTn>
+                  </p:par>
+                  <p:par>
+                    <p:cTn fill="hold">
+                      <p:stCondLst>
+                        <p:cond delay="indefinite"/>
+                      </p:stCondLst>
+                      <p:childTnLst>
+                        <p:par>
+                          <p:cTn fill="hold">
+                            <p:stCondLst>
+                              <p:cond delay="0"/>
+                            </p:stCondLst>
+                            <p:childTnLst>
+                              <p:par>
+                                <p:cTn fill="hold" nodeType="clickEffect" presetClass="entr" presetID="10" presetSubtype="0">
+                                  <p:stCondLst>
+                                    <p:cond delay="0"/>
+                                  </p:stCondLst>
+                                  <p:childTnLst>
+                                    <p:set>
+                                      <p:cBhvr>
+                                        <p:cTn dur="1" fill="hold">
+                                          <p:stCondLst>
+                                            <p:cond delay="0"/>
+                                          </p:stCondLst>
+                                        </p:cTn>
+                                        <p:tgtEl>
+                                          <p:spTgt spid="191">
+                                            <p:txEl>
+                                              <p:pRg end="2" st="2"/>
+                                            </p:txEl>
+                                          </p:spTgt>
+                                        </p:tgtEl>
+                                        <p:attrNameLst>
+                                          <p:attrName>style.visibility</p:attrName>
+                                        </p:attrNameLst>
+                                      </p:cBhvr>
+                                      <p:to>
+                                        <p:strVal val="visible"/>
+                                      </p:to>
+                                    </p:set>
+                                    <p:animEffect filter="fade" transition="in">
+                                      <p:cBhvr>
+                                        <p:cTn dur="500"/>
+                                        <p:tgtEl>
+                                          <p:spTgt spid="191">
+                                            <p:txEl>
+                                              <p:pRg end="2" st="2"/>
+                                            </p:txEl>
+                                          </p:spTgt>
+                                        </p:tgtEl>
+                                      </p:cBhvr>
+                                    </p:animEffect>
+                                  </p:childTnLst>
+                                </p:cTn>
+                              </p:par>
+                            </p:childTnLst>
+                          </p:cTn>
+                        </p:par>
+                      </p:childTnLst>
+                    </p:cTn>
+                  </p:par>
+                  <p:par>
+                    <p:cTn fill="hold">
+                      <p:stCondLst>
+                        <p:cond delay="indefinite"/>
+                      </p:stCondLst>
+                      <p:childTnLst>
+                        <p:par>
+                          <p:cTn fill="hold">
+                            <p:stCondLst>
+                              <p:cond delay="0"/>
+                            </p:stCondLst>
+                            <p:childTnLst>
+                              <p:par>
+                                <p:cTn fill="hold" nodeType="clickEffect" presetClass="entr" presetID="10" presetSubtype="0">
+                                  <p:stCondLst>
+                                    <p:cond delay="0"/>
+                                  </p:stCondLst>
+                                  <p:childTnLst>
+                                    <p:set>
+                                      <p:cBhvr>
+                                        <p:cTn dur="1" fill="hold">
+                                          <p:stCondLst>
+                                            <p:cond delay="0"/>
+                                          </p:stCondLst>
+                                        </p:cTn>
+                                        <p:tgtEl>
+                                          <p:spTgt spid="191">
+                                            <p:txEl>
+                                              <p:pRg end="3" st="3"/>
+                                            </p:txEl>
+                                          </p:spTgt>
+                                        </p:tgtEl>
+                                        <p:attrNameLst>
+                                          <p:attrName>style.visibility</p:attrName>
+                                        </p:attrNameLst>
+                                      </p:cBhvr>
+                                      <p:to>
+                                        <p:strVal val="visible"/>
+                                      </p:to>
+                                    </p:set>
+                                    <p:animEffect filter="fade" transition="in">
+                                      <p:cBhvr>
+                                        <p:cTn dur="500"/>
+                                        <p:tgtEl>
+                                          <p:spTgt spid="191">
+                                            <p:txEl>
+                                              <p:pRg end="3" st="3"/>
+                                            </p:txEl>
+                                          </p:spTgt>
+                                        </p:tgtEl>
+                                      </p:cBhvr>
+                                    </p:animEffect>
+                                  </p:childTnLst>
+                                </p:cTn>
+                              </p:par>
+                            </p:childTnLst>
+                          </p:cTn>
+                        </p:par>
+                      </p:childTnLst>
+                    </p:cTn>
+                  </p:par>
+                </p:childTnLst>
+              </p:cTn>
+              <p:prevCondLst>
+                <p:cond evt="onPrev">
+                  <p:tgtEl>
+                    <p:sldTgt/>
+                  </p:tgtEl>
+                </p:cond>
+              </p:prevCondLst>
+              <p:nextCondLst>
+                <p:cond evt="onNext">
+                  <p:tgtEl>
+                    <p:sldTgt/>
+                  </p:tgtEl>
+                </p:cond>
+              </p:nextCondLst>
+            </p:seq>
+          </p:childTnLst>
+        </p:cTn>
+      </p:par>
+    </p:tnLst>
+  </p:timing>
+</p:sld>
+</file>
+
+<file path=ppt/slides/slide4.xml><?xml version="1.0" encoding="utf-8"?>
+<p:sld xmlns:a="http://schemas.openxmlformats.org/drawingml/2006/main" xmlns:r="http://schemas.openxmlformats.org/officeDocument/2006/relationships" xmlns:mc="http://schemas.openxmlformats.org/markup-compatibility/2006" xmlns:mv="urn:schemas-microsoft-com:mac:vml" xmlns:p="http://schemas.openxmlformats.org/presentationml/2006/main" xmlns:c="http://schemas.openxmlformats.org/drawingml/2006/chart" xmlns:dgm="http://schemas.openxmlformats.org/drawingml/2006/diagram" xmlns:o="urn:schemas-microsoft-com:office:office" xmlns:v="urn:schemas-microsoft-com:vml" xmlns:pvml="urn:schemas-microsoft-com:office:powerpoint" xmlns:com="http://schemas.openxmlformats.org/drawingml/2006/compatibility" xmlns:p14="http://schemas.microsoft.com/office/powerpoint/2010/main" xmlns:p15="http://schemas.microsoft.com/office/powerpoint/2012/main" xmlns:ahyp="http://schemas.microsoft.com/office/drawing/2018/hyperlinkcolor">
+  <p:cSld>
+    <p:spTree>
+      <p:nvGrpSpPr>
+        <p:cNvPr id="195" name="Shape 195"/>
+        <p:cNvGrpSpPr/>
+        <p:nvPr/>
+      </p:nvGrpSpPr>
+      <p:grpSpPr>
+        <a:xfrm>
+          <a:off x="0" y="0"/>
+          <a:ext cx="0" cy="0"/>
+          <a:chOff x="0" y="0"/>
+          <a:chExt cx="0" cy="0"/>
+        </a:xfrm>
+      </p:grpSpPr>
+      <p:sp>
+        <p:nvSpPr>
+          <p:cNvPr id="196" name="Google Shape;196;p16"/>
+          <p:cNvSpPr txBox="1"/>
+          <p:nvPr>
+            <p:ph type="title"/>
+          </p:nvPr>
+        </p:nvSpPr>
+        <p:spPr>
+          <a:xfrm>
+            <a:off x="1297500" y="393750"/>
+            <a:ext cx="7038900" cy="914100"/>
+          </a:xfrm>
+          <a:prstGeom prst="rect">
+            <a:avLst/>
+          </a:prstGeom>
+        </p:spPr>
+        <p:txBody>
+          <a:bodyPr anchorCtr="0" anchor="t" bIns="91425" lIns="91425" spcFirstLastPara="1" rIns="91425" wrap="square" tIns="91425">
+            <a:normAutofit/>
+          </a:bodyPr>
+          <a:lstStyle/>
+          <a:p>
+            <a:pPr indent="0" lvl="0" marL="0" rtl="0" algn="l">
+              <a:spcBef>
+                <a:spcPts val="0"/>
+              </a:spcBef>
+              <a:spcAft>
+                <a:spcPts val="0"/>
+              </a:spcAft>
+              <a:buNone/>
+            </a:pPr>
+            <a:r>
+              <a:rPr lang="en" sz="3000"/>
+              <a:t>Work Division</a:t>
+            </a:r>
+            <a:endParaRPr sz="3000"/>
+          </a:p>
+        </p:txBody>
+      </p:sp>
+      <p:sp>
+        <p:nvSpPr>
+          <p:cNvPr id="197" name="Google Shape;197;p16"/>
+          <p:cNvSpPr txBox="1"/>
+          <p:nvPr>
+            <p:ph idx="1" type="body"/>
+          </p:nvPr>
+        </p:nvSpPr>
+        <p:spPr>
+          <a:xfrm>
+            <a:off x="1297500" y="1567550"/>
+            <a:ext cx="7038900" cy="2911200"/>
+          </a:xfrm>
+          <a:prstGeom prst="rect">
+            <a:avLst/>
+          </a:prstGeom>
+        </p:spPr>
+        <p:txBody>
+          <a:bodyPr anchorCtr="0" anchor="t" bIns="91425" lIns="91425" spcFirstLastPara="1" rIns="91425" wrap="square" tIns="91425">
+            <a:normAutofit/>
+          </a:bodyPr>
+          <a:lstStyle/>
+          <a:p>
+            <a:pPr indent="0" lvl="0" marL="0" rtl="0" algn="l">
+              <a:spcBef>
+                <a:spcPts val="0"/>
+              </a:spcBef>
+              <a:spcAft>
+                <a:spcPts val="0"/>
+              </a:spcAft>
+              <a:buNone/>
+            </a:pPr>
+            <a:r>
+              <a:rPr lang="en" sz="2000"/>
+              <a:t>Shantanu  -  DO_MPC</a:t>
+            </a:r>
+            <a:endParaRPr sz="2000"/>
+          </a:p>
+          <a:p>
+            <a:pPr indent="0" lvl="0" marL="0" rtl="0" algn="l">
+              <a:spcBef>
+                <a:spcPts val="1200"/>
+              </a:spcBef>
+              <a:spcAft>
+                <a:spcPts val="0"/>
+              </a:spcAft>
+              <a:buNone/>
+            </a:pPr>
+            <a:r>
+              <a:rPr lang="en" sz="2000"/>
+              <a:t>Shivam  -  Gazebo</a:t>
+            </a:r>
+            <a:endParaRPr sz="2000"/>
+          </a:p>
+          <a:p>
+            <a:pPr indent="0" lvl="0" marL="0" rtl="0" algn="l">
+              <a:spcBef>
+                <a:spcPts val="1200"/>
+              </a:spcBef>
+              <a:spcAft>
+                <a:spcPts val="0"/>
+              </a:spcAft>
+              <a:buNone/>
+            </a:pPr>
+            <a:r>
+              <a:rPr lang="en" sz="2000"/>
+              <a:t>Sidhant  -  ROS</a:t>
+            </a:r>
+            <a:endParaRPr sz="2000"/>
+          </a:p>
+          <a:p>
+            <a:pPr indent="0" lvl="0" marL="0" rtl="0" algn="l">
+              <a:spcBef>
+                <a:spcPts val="1200"/>
+              </a:spcBef>
+              <a:spcAft>
+                <a:spcPts val="0"/>
+              </a:spcAft>
+              <a:buNone/>
+            </a:pPr>
+            <a:r>
+              <a:rPr lang="en" sz="2000"/>
+              <a:t>Vinayak  -  Motor Controller</a:t>
+            </a:r>
+            <a:endParaRPr sz="2000"/>
+          </a:p>
+          <a:p>
+            <a:pPr indent="0" lvl="0" marL="0" rtl="0" algn="l">
+              <a:spcBef>
+                <a:spcPts val="1200"/>
+              </a:spcBef>
+              <a:spcAft>
+                <a:spcPts val="1200"/>
+              </a:spcAft>
+              <a:buNone/>
+            </a:pPr>
+            <a:r>
+              <a:rPr lang="en" sz="2000"/>
+              <a:t>Hanan  -  Optimization Controller, ROS</a:t>
+            </a:r>
+            <a:endParaRPr sz="2000"/>
+          </a:p>
+        </p:txBody>
+      </p:sp>
+    </p:spTree>
+  </p:cSld>
+  <p:clrMapOvr>
+    <a:masterClrMapping/>
+  </p:clrMapOvr>
+  <mc:AlternateContent>
+    <mc:Choice Requires="p14">
+      <p:transition spd="slow" p14:dur="1000">
+        <p:push/>
+      </p:transition>
+    </mc:Choice>
+    <mc:Fallback>
+      <p:transition spd="slow">
+        <p:fade/>
+      </p:transition>
+    </mc:Fallback>
+  </mc:AlternateContent>
+  <p:timing>
+    <p:tnLst>
+      <p:par>
+        <p:cTn dur="indefinite" nodeType="tmRoot" restart="never">
+          <p:childTnLst>
+            <p:seq concurrent="1" nextAc="seek">
+              <p:cTn dur="indefinite" id="2" nodeType="mainSeq">
+                <p:childTnLst>
+                  <p:par>
+                    <p:cTn fill="hold">
+                      <p:stCondLst>
+                        <p:cond delay="indefinite"/>
+                      </p:stCondLst>
+                      <p:childTnLst>
+                        <p:par>
+                          <p:cTn fill="hold">
+                            <p:stCondLst>
+                              <p:cond delay="0"/>
+                            </p:stCondLst>
+                            <p:childTnLst>
+                              <p:par>
+                                <p:cTn fill="hold" nodeType="clickEffect" presetClass="entr" presetID="23" presetSubtype="16">
+                                  <p:stCondLst>
+                                    <p:cond delay="0"/>
+                                  </p:stCondLst>
+                                  <p:childTnLst>
+                                    <p:set>
+                                      <p:cBhvr>
+                                        <p:cTn dur="1" fill="hold">
+                                          <p:stCondLst>
+                                            <p:cond delay="0"/>
+                                          </p:stCondLst>
+                                        </p:cTn>
+                                        <p:tgtEl>
+                                          <p:spTgt spid="197">
+                                            <p:txEl>
+                                              <p:pRg end="0" st="0"/>
+                                            </p:txEl>
+                                          </p:spTgt>
+                                        </p:tgtEl>
+                                        <p:attrNameLst>
+                                          <p:attrName>style.visibility</p:attrName>
+                                        </p:attrNameLst>
+                                      </p:cBhvr>
+                                      <p:to>
+                                        <p:strVal val="visible"/>
+                                      </p:to>
+                                    </p:set>
+                                    <p:anim calcmode="lin" valueType="num">
+                                      <p:cBhvr additive="base">
+                                        <p:cTn dur="500"/>
+                                        <p:tgtEl>
+                                          <p:spTgt spid="197">
+                                            <p:txEl>
+                                              <p:pRg end="0" st="0"/>
+                                            </p:txEl>
+                                          </p:spTgt>
+                                        </p:tgtEl>
+                                        <p:attrNameLst>
+                                          <p:attrName>ppt_w</p:attrName>
+                                        </p:attrNameLst>
+                                      </p:cBhvr>
+                                      <p:tavLst>
+                                        <p:tav fmla="" tm="0">
+                                          <p:val>
+                                            <p:strVal val="0"/>
+                                          </p:val>
+                                        </p:tav>
+                                        <p:tav fmla="" tm="100000">
+                                          <p:val>
+                                            <p:strVal val="#ppt_w"/>
+                                          </p:val>
+                                        </p:tav>
+                                      </p:tavLst>
+                                    </p:anim>
+                                    <p:anim calcmode="lin" valueType="num">
+                                      <p:cBhvr additive="base">
+                                        <p:cTn dur="500"/>
+                                        <p:tgtEl>
+                                          <p:spTgt spid="197">
+                                            <p:txEl>
+                                              <p:pRg end="0" st="0"/>
+                                            </p:txEl>
+                                          </p:spTgt>
+                                        </p:tgtEl>
+                                        <p:attrNameLst>
+                                          <p:attrName>ppt_h</p:attrName>
+                                        </p:attrNameLst>
+                                      </p:cBhvr>
+                                      <p:tavLst>
+                                        <p:tav fmla="" tm="0">
+                                          <p:val>
+                                            <p:strVal val="0"/>
+                                          </p:val>
+                                        </p:tav>
+                                        <p:tav fmla="" tm="100000">
+                                          <p:val>
+                                            <p:strVal val="#ppt_h"/>
+                                          </p:val>
+                                        </p:tav>
+                                      </p:tavLst>
+                                    </p:anim>
+                                  </p:childTnLst>
+                                </p:cTn>
+                              </p:par>
+                            </p:childTnLst>
+                          </p:cTn>
+                        </p:par>
+                      </p:childTnLst>
+                    </p:cTn>
+                  </p:par>
+                  <p:par>
+                    <p:cTn fill="hold">
+                      <p:stCondLst>
+                        <p:cond delay="indefinite"/>
+                      </p:stCondLst>
+                      <p:childTnLst>
+                        <p:par>
+                          <p:cTn fill="hold">
+                            <p:stCondLst>
+                              <p:cond delay="0"/>
+                            </p:stCondLst>
+                            <p:childTnLst>
+                              <p:par>
+                                <p:cTn fill="hold" nodeType="clickEffect" presetClass="entr" presetID="23" presetSubtype="16">
+                                  <p:stCondLst>
+                                    <p:cond delay="0"/>
+                                  </p:stCondLst>
+                                  <p:childTnLst>
+                                    <p:set>
+                                      <p:cBhvr>
+                                        <p:cTn dur="1" fill="hold">
+                                          <p:stCondLst>
+                                            <p:cond delay="0"/>
+                                          </p:stCondLst>
+                                        </p:cTn>
+                                        <p:tgtEl>
+                                          <p:spTgt spid="197">
+                                            <p:txEl>
+                                              <p:pRg end="1" st="1"/>
+                                            </p:txEl>
+                                          </p:spTgt>
+                                        </p:tgtEl>
+                                        <p:attrNameLst>
+                                          <p:attrName>style.visibility</p:attrName>
+                                        </p:attrNameLst>
+                                      </p:cBhvr>
+                                      <p:to>
+                                        <p:strVal val="visible"/>
+                                      </p:to>
+                                    </p:set>
+                                    <p:anim calcmode="lin" valueType="num">
+                                      <p:cBhvr additive="base">
+                                        <p:cTn dur="500"/>
+                                        <p:tgtEl>
+                                          <p:spTgt spid="197">
+                                            <p:txEl>
+                                              <p:pRg end="1" st="1"/>
+                                            </p:txEl>
+                                          </p:spTgt>
+                                        </p:tgtEl>
+                                        <p:attrNameLst>
+                                          <p:attrName>ppt_w</p:attrName>
+                                        </p:attrNameLst>
+                                      </p:cBhvr>
+                                      <p:tavLst>
+                                        <p:tav fmla="" tm="0">
+                                          <p:val>
+                                            <p:strVal val="0"/>
+                                          </p:val>
+                                        </p:tav>
+                                        <p:tav fmla="" tm="100000">
+                                          <p:val>
+                                            <p:strVal val="#ppt_w"/>
+                                          </p:val>
+                                        </p:tav>
+                                      </p:tavLst>
+                                    </p:anim>
+                                    <p:anim calcmode="lin" valueType="num">
+                                      <p:cBhvr additive="base">
+                                        <p:cTn dur="500"/>
+                                        <p:tgtEl>
+                                          <p:spTgt spid="197">
+                                            <p:txEl>
+                                              <p:pRg end="1" st="1"/>
+                                            </p:txEl>
+                                          </p:spTgt>
+                                        </p:tgtEl>
+                                        <p:attrNameLst>
+                                          <p:attrName>ppt_h</p:attrName>
+                                        </p:attrNameLst>
+                                      </p:cBhvr>
+                                      <p:tavLst>
+                                        <p:tav fmla="" tm="0">
+                                          <p:val>
+                                            <p:strVal val="0"/>
+                                          </p:val>
+                                        </p:tav>
+                                        <p:tav fmla="" tm="100000">
+                                          <p:val>
+                                            <p:strVal val="#ppt_h"/>
+                                          </p:val>
+                                        </p:tav>
+                                      </p:tavLst>
+                                    </p:anim>
+                                  </p:childTnLst>
+                                </p:cTn>
+                              </p:par>
+                            </p:childTnLst>
+                          </p:cTn>
+                        </p:par>
+                      </p:childTnLst>
+                    </p:cTn>
+                  </p:par>
+                  <p:par>
+                    <p:cTn fill="hold">
+                      <p:stCondLst>
+                        <p:cond delay="indefinite"/>
+                      </p:stCondLst>
+                      <p:childTnLst>
+                        <p:par>
+                          <p:cTn fill="hold">
+                            <p:stCondLst>
+                              <p:cond delay="0"/>
+                            </p:stCondLst>
+                            <p:childTnLst>
+                              <p:par>
+                                <p:cTn fill="hold" nodeType="clickEffect" presetClass="entr" presetID="23" presetSubtype="16">
+                                  <p:stCondLst>
+                                    <p:cond delay="0"/>
+                                  </p:stCondLst>
+                                  <p:childTnLst>
+                                    <p:set>
+                                      <p:cBhvr>
+                                        <p:cTn dur="1" fill="hold">
+                                          <p:stCondLst>
+                                            <p:cond delay="0"/>
+                                          </p:stCondLst>
+                                        </p:cTn>
+                                        <p:tgtEl>
+                                          <p:spTgt spid="197">
+                                            <p:txEl>
+                                              <p:pRg end="2" st="2"/>
+                                            </p:txEl>
+                                          </p:spTgt>
+                                        </p:tgtEl>
+                                        <p:attrNameLst>
+                                          <p:attrName>style.visibility</p:attrName>
+                                        </p:attrNameLst>
+                                      </p:cBhvr>
+                                      <p:to>
+                                        <p:strVal val="visible"/>
+                                      </p:to>
+                                    </p:set>
+                                    <p:anim calcmode="lin" valueType="num">
+                                      <p:cBhvr additive="base">
+                                        <p:cTn dur="500"/>
+                                        <p:tgtEl>
+                                          <p:spTgt spid="197">
+                                            <p:txEl>
+                                              <p:pRg end="2" st="2"/>
+                                            </p:txEl>
+                                          </p:spTgt>
+                                        </p:tgtEl>
+                                        <p:attrNameLst>
+                                          <p:attrName>ppt_w</p:attrName>
+                                        </p:attrNameLst>
+                                      </p:cBhvr>
+                                      <p:tavLst>
+                                        <p:tav fmla="" tm="0">
+                                          <p:val>
+                                            <p:strVal val="0"/>
+                                          </p:val>
+                                        </p:tav>
+                                        <p:tav fmla="" tm="100000">
+                                          <p:val>
+                                            <p:strVal val="#ppt_w"/>
+                                          </p:val>
+                                        </p:tav>
+                                      </p:tavLst>
+                                    </p:anim>
+                                    <p:anim calcmode="lin" valueType="num">
+                                      <p:cBhvr additive="base">
+                                        <p:cTn dur="500"/>
+                                        <p:tgtEl>
+                                          <p:spTgt spid="197">
+                                            <p:txEl>
+                                              <p:pRg end="2" st="2"/>
+                                            </p:txEl>
+                                          </p:spTgt>
+                                        </p:tgtEl>
+                                        <p:attrNameLst>
+                                          <p:attrName>ppt_h</p:attrName>
+                                        </p:attrNameLst>
+                                      </p:cBhvr>
+                                      <p:tavLst>
+                                        <p:tav fmla="" tm="0">
+                                          <p:val>
+                                            <p:strVal val="0"/>
+                                          </p:val>
+                                        </p:tav>
+                                        <p:tav fmla="" tm="100000">
+                                          <p:val>
+                                            <p:strVal val="#ppt_h"/>
+                                          </p:val>
+                                        </p:tav>
+                                      </p:tavLst>
+                                    </p:anim>
+                                  </p:childTnLst>
+                                </p:cTn>
+                              </p:par>
+                            </p:childTnLst>
+                          </p:cTn>
+                        </p:par>
+                      </p:childTnLst>
+                    </p:cTn>
+                  </p:par>
+                  <p:par>
+                    <p:cTn fill="hold">
+                      <p:stCondLst>
+                        <p:cond delay="indefinite"/>
+                      </p:stCondLst>
+                      <p:childTnLst>
+                        <p:par>
+                          <p:cTn fill="hold">
+                            <p:stCondLst>
+                              <p:cond delay="0"/>
+                            </p:stCondLst>
+                            <p:childTnLst>
+                              <p:par>
+                                <p:cTn fill="hold" nodeType="clickEffect" presetClass="entr" presetID="23" presetSubtype="16">
+                                  <p:stCondLst>
+                                    <p:cond delay="0"/>
+                                  </p:stCondLst>
+                                  <p:childTnLst>
+                                    <p:set>
+                                      <p:cBhvr>
+                                        <p:cTn dur="1" fill="hold">
+                                          <p:stCondLst>
+                                            <p:cond delay="0"/>
+                                          </p:stCondLst>
+                                        </p:cTn>
+                                        <p:tgtEl>
+                                          <p:spTgt spid="197">
+                                            <p:txEl>
+                                              <p:pRg end="3" st="3"/>
+                                            </p:txEl>
+                                          </p:spTgt>
+                                        </p:tgtEl>
+                                        <p:attrNameLst>
+                                          <p:attrName>style.visibility</p:attrName>
+                                        </p:attrNameLst>
+                                      </p:cBhvr>
+                                      <p:to>
+                                        <p:strVal val="visible"/>
+                                      </p:to>
+                                    </p:set>
+                                    <p:anim calcmode="lin" valueType="num">
+                                      <p:cBhvr additive="base">
+                                        <p:cTn dur="500"/>
+                                        <p:tgtEl>
+                                          <p:spTgt spid="197">
+                                            <p:txEl>
+                                              <p:pRg end="3" st="3"/>
+                                            </p:txEl>
+                                          </p:spTgt>
+                                        </p:tgtEl>
+                                        <p:attrNameLst>
+                                          <p:attrName>ppt_w</p:attrName>
+                                        </p:attrNameLst>
+                                      </p:cBhvr>
+                                      <p:tavLst>
+                                        <p:tav fmla="" tm="0">
+                                          <p:val>
+                                            <p:strVal val="0"/>
+                                          </p:val>
+                                        </p:tav>
+                                        <p:tav fmla="" tm="100000">
+                                          <p:val>
+                                            <p:strVal val="#ppt_w"/>
+                                          </p:val>
+                                        </p:tav>
+                                      </p:tavLst>
+                                    </p:anim>
+                                    <p:anim calcmode="lin" valueType="num">
+                                      <p:cBhvr additive="base">
+                                        <p:cTn dur="500"/>
+                                        <p:tgtEl>
+                                          <p:spTgt spid="197">
+                                            <p:txEl>
+                                              <p:pRg end="3" st="3"/>
+                                            </p:txEl>
+                                          </p:spTgt>
+                                        </p:tgtEl>
+                                        <p:attrNameLst>
+                                          <p:attrName>ppt_h</p:attrName>
+                                        </p:attrNameLst>
+                                      </p:cBhvr>
+                                      <p:tavLst>
+                                        <p:tav fmla="" tm="0">
+                                          <p:val>
+                                            <p:strVal val="0"/>
+                                          </p:val>
+                                        </p:tav>
+                                        <p:tav fmla="" tm="100000">
+                                          <p:val>
+                                            <p:strVal val="#ppt_h"/>
+                                          </p:val>
+                                        </p:tav>
+                                      </p:tavLst>
+                                    </p:anim>
+                                  </p:childTnLst>
+                                </p:cTn>
+                              </p:par>
+                            </p:childTnLst>
+                          </p:cTn>
+                        </p:par>
+                      </p:childTnLst>
+                    </p:cTn>
+                  </p:par>
+                  <p:par>
+                    <p:cTn fill="hold">
+                      <p:stCondLst>
+                        <p:cond delay="indefinite"/>
+                      </p:stCondLst>
+                      <p:childTnLst>
+                        <p:par>
+                          <p:cTn fill="hold">
+                            <p:stCondLst>
+                              <p:cond delay="0"/>
+                            </p:stCondLst>
+                            <p:childTnLst>
+                              <p:par>
+                                <p:cTn fill="hold" nodeType="clickEffect" presetClass="entr" presetID="23" presetSubtype="16">
+                                  <p:stCondLst>
+                                    <p:cond delay="0"/>
+                                  </p:stCondLst>
+                                  <p:childTnLst>
+                                    <p:set>
+                                      <p:cBhvr>
+                                        <p:cTn dur="1" fill="hold">
+                                          <p:stCondLst>
+                                            <p:cond delay="0"/>
+                                          </p:stCondLst>
+                                        </p:cTn>
+                                        <p:tgtEl>
+                                          <p:spTgt spid="197">
+                                            <p:txEl>
+                                              <p:pRg end="4" st="4"/>
+                                            </p:txEl>
+                                          </p:spTgt>
+                                        </p:tgtEl>
+                                        <p:attrNameLst>
+                                          <p:attrName>style.visibility</p:attrName>
+                                        </p:attrNameLst>
+                                      </p:cBhvr>
+                                      <p:to>
+                                        <p:strVal val="visible"/>
+                                      </p:to>
+                                    </p:set>
+                                    <p:anim calcmode="lin" valueType="num">
+                                      <p:cBhvr additive="base">
+                                        <p:cTn dur="500"/>
+                                        <p:tgtEl>
+                                          <p:spTgt spid="197">
+                                            <p:txEl>
+                                              <p:pRg end="4" st="4"/>
+                                            </p:txEl>
+                                          </p:spTgt>
+                                        </p:tgtEl>
+                                        <p:attrNameLst>
+                                          <p:attrName>ppt_w</p:attrName>
+                                        </p:attrNameLst>
+                                      </p:cBhvr>
+                                      <p:tavLst>
+                                        <p:tav fmla="" tm="0">
+                                          <p:val>
+                                            <p:strVal val="0"/>
+                                          </p:val>
+                                        </p:tav>
+                                        <p:tav fmla="" tm="100000">
+                                          <p:val>
+                                            <p:strVal val="#ppt_w"/>
+                                          </p:val>
+                                        </p:tav>
+                                      </p:tavLst>
+                                    </p:anim>
+                                    <p:anim calcmode="lin" valueType="num">
+                                      <p:cBhvr additive="base">
+                                        <p:cTn dur="500"/>
+                                        <p:tgtEl>
+                                          <p:spTgt spid="197">
+                                            <p:txEl>
+                                              <p:pRg end="4" st="4"/>
+                                            </p:txEl>
+                                          </p:spTgt>
+                                        </p:tgtEl>
+                                        <p:attrNameLst>
+                                          <p:attrName>ppt_h</p:attrName>
+                                        </p:attrNameLst>
+                                      </p:cBhvr>
+                                      <p:tavLst>
+                                        <p:tav fmla="" tm="0">
+                                          <p:val>
+                                            <p:strVal val="0"/>
+                                          </p:val>
+                                        </p:tav>
+                                        <p:tav fmla="" tm="100000">
+                                          <p:val>
+                                            <p:strVal val="#ppt_h"/>
+                                          </p:val>
+                                        </p:tav>
+                                      </p:tavLst>
+                                    </p:anim>
+                                  </p:childTnLst>
+                                </p:cTn>
+                              </p:par>
+                            </p:childTnLst>
+                          </p:cTn>
+                        </p:par>
+                      </p:childTnLst>
+                    </p:cTn>
+                  </p:par>
+                </p:childTnLst>
+              </p:cTn>
+              <p:prevCondLst>
+                <p:cond evt="onPrev">
+                  <p:tgtEl>
+                    <p:sldTgt/>
+                  </p:tgtEl>
+                </p:cond>
+              </p:prevCondLst>
+              <p:nextCondLst>
+                <p:cond evt="onNext">
+                  <p:tgtEl>
+                    <p:sldTgt/>
+                  </p:tgtEl>
+                </p:cond>
+              </p:nextCondLst>
+            </p:seq>
+          </p:childTnLst>
+        </p:cTn>
+      </p:par>
+    </p:tnLst>
+  </p:timing>
+</p:sld>
+</file>
+
+<file path=ppt/slides/slide5.xml><?xml version="1.0" encoding="utf-8"?>
+<p:sld xmlns:a="http://schemas.openxmlformats.org/drawingml/2006/main" xmlns:r="http://schemas.openxmlformats.org/officeDocument/2006/relationships" xmlns:mc="http://schemas.openxmlformats.org/markup-compatibility/2006" xmlns:mv="urn:schemas-microsoft-com:mac:vml" xmlns:p="http://schemas.openxmlformats.org/presentationml/2006/main" xmlns:c="http://schemas.openxmlformats.org/drawingml/2006/chart" xmlns:dgm="http://schemas.openxmlformats.org/drawingml/2006/diagram" xmlns:o="urn:schemas-microsoft-com:office:office" xmlns:v="urn:schemas-microsoft-com:vml" xmlns:pvml="urn:schemas-microsoft-com:office:powerpoint" xmlns:com="http://schemas.openxmlformats.org/drawingml/2006/compatibility" xmlns:p14="http://schemas.microsoft.com/office/powerpoint/2010/main" xmlns:p15="http://schemas.microsoft.com/office/powerpoint/2012/main" xmlns:ahyp="http://schemas.microsoft.com/office/drawing/2018/hyperlinkcolor">
+  <p:cSld>
+    <p:spTree>
+      <p:nvGrpSpPr>
+        <p:cNvPr id="201" name="Shape 201"/>
+        <p:cNvGrpSpPr/>
+        <p:nvPr/>
+      </p:nvGrpSpPr>
+      <p:grpSpPr>
+        <a:xfrm>
+          <a:off x="0" y="0"/>
+          <a:ext cx="0" cy="0"/>
+          <a:chOff x="0" y="0"/>
+          <a:chExt cx="0" cy="0"/>
+        </a:xfrm>
+      </p:grpSpPr>
+      <p:sp>
+        <p:nvSpPr>
+          <p:cNvPr id="202" name="Google Shape;202;p17"/>
+          <p:cNvSpPr txBox="1"/>
+          <p:nvPr>
+            <p:ph idx="1" type="body"/>
+          </p:nvPr>
+        </p:nvSpPr>
+        <p:spPr>
+          <a:xfrm>
+            <a:off x="2727750" y="2037450"/>
+            <a:ext cx="3688500" cy="1068600"/>
+          </a:xfrm>
+          <a:prstGeom prst="rect">
+            <a:avLst/>
+          </a:prstGeom>
+        </p:spPr>
+        <p:txBody>
+          <a:bodyPr anchorCtr="0" anchor="t" bIns="91425" lIns="91425" spcFirstLastPara="1" rIns="91425" wrap="square" tIns="91425">
+            <a:noAutofit/>
+          </a:bodyPr>
+          <a:lstStyle/>
+          <a:p>
+            <a:pPr indent="0" lvl="0" marL="0" rtl="0" algn="l">
+              <a:spcBef>
+                <a:spcPts val="0"/>
+              </a:spcBef>
+              <a:spcAft>
+                <a:spcPts val="1200"/>
+              </a:spcAft>
+              <a:buNone/>
+            </a:pPr>
+            <a:r>
+              <a:rPr lang="en" sz="6000"/>
+              <a:t>Thank You</a:t>
+            </a:r>
+            <a:endParaRPr sz="6000"/>
+          </a:p>
+        </p:txBody>
+      </p:sp>
+    </p:spTree>
+  </p:cSld>
+  <p:clrMapOvr>
+    <a:masterClrMapping/>
+  </p:clrMapOvr>
+  <mc:AlternateContent>
+    <mc:Choice Requires="p14">
+      <p:transition spd="slow" p14:dur="1000">
+        <p14:flip dir="l"/>
+      </p:transition>
+    </mc:Choice>
+    <mc:Fallback>
+      <p:transition spd="slow">
+        <p:fade/>
+      </p:transition>
+    </mc:Fallback>
+  </mc:AlternateContent>
+  <p:timing>
+    <p:tnLst>
+      <p:par>
+        <p:cTn dur="indefinite" nodeType="tmRoot" restart="never">
+          <p:childTnLst>
+            <p:seq concurrent="1" nextAc="seek">
+              <p:cTn dur="indefinite" id="2" nodeType="mainSeq">
+                <p:childTnLst>
+                  <p:par>
+                    <p:cTn fill="hold">
+                      <p:stCondLst>
+                        <p:cond delay="indefinite"/>
+                      </p:stCondLst>
+                      <p:childTnLst>
+                        <p:par>
+                          <p:cTn fill="hold">
+                            <p:stCondLst>
+                              <p:cond delay="0"/>
+                            </p:stCondLst>
+                            <p:childTnLst>
+                              <p:par>
+                                <p:cTn fill="hold" nodeType="clickEffect" presetClass="entr" presetID="2" presetSubtype="1">
+                                  <p:stCondLst>
+                                    <p:cond delay="0"/>
+                                  </p:stCondLst>
+                                  <p:childTnLst>
+                                    <p:set>
+                                      <p:cBhvr>
+                                        <p:cTn dur="1" fill="hold">
+                                          <p:stCondLst>
+                                            <p:cond delay="0"/>
+                                          </p:stCondLst>
+                                        </p:cTn>
+                                        <p:tgtEl>
+                                          <p:spTgt spid="202"/>
+                                        </p:tgtEl>
+                                        <p:attrNameLst>
+                                          <p:attrName>style.visibility</p:attrName>
+                                        </p:attrNameLst>
+                                      </p:cBhvr>
+                                      <p:to>
+                                        <p:strVal val="visible"/>
+                                      </p:to>
+                                    </p:set>
+                                    <p:anim calcmode="lin" valueType="num">
+                                      <p:cBhvr additive="base">
+                                        <p:cTn dur="1000"/>
+                                        <p:tgtEl>
+                                          <p:spTgt spid="202"/>
+                                        </p:tgtEl>
+                                        <p:attrNameLst>
+                                          <p:attrName>ppt_y</p:attrName>
+                                        </p:attrNameLst>
+                                      </p:cBhvr>
+                                      <p:tavLst>
+                                        <p:tav fmla="" tm="0">
+                                          <p:val>
+                                            <p:strVal val="#ppt_y-1"/>
+                                          </p:val>
+                                        </p:tav>
+                                        <p:tav fmla="" tm="100000">
+                                          <p:val>
+                                            <p:strVal val="#ppt_y"/>
+                                          </p:val>
+                                        </p:tav>
+                                      </p:tavLst>
+                                    </p:anim>
                                   </p:childTnLst>
                                 </p:cTn>
                               </p:par>

</xml_diff>